<commit_message>
Update pulses and documentations
</commit_message>
<xml_diff>
--- a/documentation_device.pptx
+++ b/documentation_device.pptx
@@ -7,18 +7,21 @@
   <p:sldIdLst>
     <p:sldId id="256" r:id="rId2"/>
     <p:sldId id="257" r:id="rId3"/>
-    <p:sldId id="258" r:id="rId4"/>
-    <p:sldId id="267" r:id="rId5"/>
-    <p:sldId id="269" r:id="rId6"/>
-    <p:sldId id="268" r:id="rId7"/>
-    <p:sldId id="259" r:id="rId8"/>
-    <p:sldId id="270" r:id="rId9"/>
-    <p:sldId id="260" r:id="rId10"/>
-    <p:sldId id="261" r:id="rId11"/>
-    <p:sldId id="273" r:id="rId12"/>
-    <p:sldId id="272" r:id="rId13"/>
-    <p:sldId id="262" r:id="rId14"/>
-    <p:sldId id="266" r:id="rId15"/>
+    <p:sldId id="276" r:id="rId4"/>
+    <p:sldId id="258" r:id="rId5"/>
+    <p:sldId id="267" r:id="rId6"/>
+    <p:sldId id="269" r:id="rId7"/>
+    <p:sldId id="268" r:id="rId8"/>
+    <p:sldId id="259" r:id="rId9"/>
+    <p:sldId id="270" r:id="rId10"/>
+    <p:sldId id="260" r:id="rId11"/>
+    <p:sldId id="261" r:id="rId12"/>
+    <p:sldId id="273" r:id="rId13"/>
+    <p:sldId id="272" r:id="rId14"/>
+    <p:sldId id="275" r:id="rId15"/>
+    <p:sldId id="262" r:id="rId16"/>
+    <p:sldId id="274" r:id="rId17"/>
+    <p:sldId id="266" r:id="rId18"/>
   </p:sldIdLst>
   <p:sldSz cx="12192000" cy="6858000"/>
   <p:notesSz cx="6858000" cy="9144000"/>
@@ -274,7 +277,7 @@
           <a:p>
             <a:fld id="{E1220816-16DB-4C6E-82FB-E75E46147CB6}" type="datetimeFigureOut">
               <a:rPr lang="en-US" smtClean="0"/>
-              <a:t>9/16/2025</a:t>
+              <a:t>9/17/2025</a:t>
             </a:fld>
             <a:endParaRPr lang="en-US"/>
           </a:p>
@@ -474,7 +477,7 @@
           <a:p>
             <a:fld id="{E1220816-16DB-4C6E-82FB-E75E46147CB6}" type="datetimeFigureOut">
               <a:rPr lang="en-US" smtClean="0"/>
-              <a:t>9/16/2025</a:t>
+              <a:t>9/17/2025</a:t>
             </a:fld>
             <a:endParaRPr lang="en-US"/>
           </a:p>
@@ -684,7 +687,7 @@
           <a:p>
             <a:fld id="{E1220816-16DB-4C6E-82FB-E75E46147CB6}" type="datetimeFigureOut">
               <a:rPr lang="en-US" smtClean="0"/>
-              <a:t>9/16/2025</a:t>
+              <a:t>9/17/2025</a:t>
             </a:fld>
             <a:endParaRPr lang="en-US"/>
           </a:p>
@@ -884,7 +887,7 @@
           <a:p>
             <a:fld id="{E1220816-16DB-4C6E-82FB-E75E46147CB6}" type="datetimeFigureOut">
               <a:rPr lang="en-US" smtClean="0"/>
-              <a:t>9/16/2025</a:t>
+              <a:t>9/17/2025</a:t>
             </a:fld>
             <a:endParaRPr lang="en-US"/>
           </a:p>
@@ -1160,7 +1163,7 @@
           <a:p>
             <a:fld id="{E1220816-16DB-4C6E-82FB-E75E46147CB6}" type="datetimeFigureOut">
               <a:rPr lang="en-US" smtClean="0"/>
-              <a:t>9/16/2025</a:t>
+              <a:t>9/17/2025</a:t>
             </a:fld>
             <a:endParaRPr lang="en-US"/>
           </a:p>
@@ -1428,7 +1431,7 @@
           <a:p>
             <a:fld id="{E1220816-16DB-4C6E-82FB-E75E46147CB6}" type="datetimeFigureOut">
               <a:rPr lang="en-US" smtClean="0"/>
-              <a:t>9/16/2025</a:t>
+              <a:t>9/17/2025</a:t>
             </a:fld>
             <a:endParaRPr lang="en-US"/>
           </a:p>
@@ -1843,7 +1846,7 @@
           <a:p>
             <a:fld id="{E1220816-16DB-4C6E-82FB-E75E46147CB6}" type="datetimeFigureOut">
               <a:rPr lang="en-US" smtClean="0"/>
-              <a:t>9/16/2025</a:t>
+              <a:t>9/17/2025</a:t>
             </a:fld>
             <a:endParaRPr lang="en-US"/>
           </a:p>
@@ -1985,7 +1988,7 @@
           <a:p>
             <a:fld id="{E1220816-16DB-4C6E-82FB-E75E46147CB6}" type="datetimeFigureOut">
               <a:rPr lang="en-US" smtClean="0"/>
-              <a:t>9/16/2025</a:t>
+              <a:t>9/17/2025</a:t>
             </a:fld>
             <a:endParaRPr lang="en-US"/>
           </a:p>
@@ -2098,7 +2101,7 @@
           <a:p>
             <a:fld id="{E1220816-16DB-4C6E-82FB-E75E46147CB6}" type="datetimeFigureOut">
               <a:rPr lang="en-US" smtClean="0"/>
-              <a:t>9/16/2025</a:t>
+              <a:t>9/17/2025</a:t>
             </a:fld>
             <a:endParaRPr lang="en-US"/>
           </a:p>
@@ -2411,7 +2414,7 @@
           <a:p>
             <a:fld id="{E1220816-16DB-4C6E-82FB-E75E46147CB6}" type="datetimeFigureOut">
               <a:rPr lang="en-US" smtClean="0"/>
-              <a:t>9/16/2025</a:t>
+              <a:t>9/17/2025</a:t>
             </a:fld>
             <a:endParaRPr lang="en-US"/>
           </a:p>
@@ -2700,7 +2703,7 @@
           <a:p>
             <a:fld id="{E1220816-16DB-4C6E-82FB-E75E46147CB6}" type="datetimeFigureOut">
               <a:rPr lang="en-US" smtClean="0"/>
-              <a:t>9/16/2025</a:t>
+              <a:t>9/17/2025</a:t>
             </a:fld>
             <a:endParaRPr lang="en-US"/>
           </a:p>
@@ -2943,7 +2946,7 @@
           <a:p>
             <a:fld id="{E1220816-16DB-4C6E-82FB-E75E46147CB6}" type="datetimeFigureOut">
               <a:rPr lang="en-US" smtClean="0"/>
-              <a:t>9/16/2025</a:t>
+              <a:t>9/17/2025</a:t>
             </a:fld>
             <a:endParaRPr lang="en-US"/>
           </a:p>
@@ -3451,7 +3454,7 @@
           <p:cNvPr id="2" name="标题 1">
             <a:extLst>
               <a:ext uri="{FF2B5EF4-FFF2-40B4-BE49-F238E27FC236}">
-                <a16:creationId xmlns:a16="http://schemas.microsoft.com/office/drawing/2014/main" id="{F649B5E2-4C7A-F205-4042-16927A11CA2A}"/>
+                <a16:creationId xmlns:a16="http://schemas.microsoft.com/office/drawing/2014/main" id="{E062D5C1-1152-3FBF-F7B6-7F82E63C694D}"/>
               </a:ext>
             </a:extLst>
           </p:cNvPr>
@@ -3469,24 +3472,26 @@
           <a:p>
             <a:r>
               <a:rPr lang="en-US" dirty="0"/>
-              <a:t>Counter</a:t>
+              <a:t>Remote device</a:t>
             </a:r>
           </a:p>
         </p:txBody>
       </p:sp>
       <p:pic>
         <p:nvPicPr>
-          <p:cNvPr id="5" name="Picture 4" descr="A screen shot of a computer program&#10;&#10;AI-generated content may be incorrect.">
-            <a:extLst>
-              <a:ext uri="{FF2B5EF4-FFF2-40B4-BE49-F238E27FC236}">
-                <a16:creationId xmlns:a16="http://schemas.microsoft.com/office/drawing/2014/main" id="{063FC0C7-9B64-BF52-F289-D6BA0FAB90A5}"/>
+          <p:cNvPr id="5" name="Content Placeholder 4" descr="A screenshot of a chat&#10;&#10;AI-generated content may be incorrect.">
+            <a:extLst>
+              <a:ext uri="{FF2B5EF4-FFF2-40B4-BE49-F238E27FC236}">
+                <a16:creationId xmlns:a16="http://schemas.microsoft.com/office/drawing/2014/main" id="{B8688DBB-24CD-AD23-5EAB-EC6041DBC932}"/>
               </a:ext>
             </a:extLst>
           </p:cNvPr>
           <p:cNvPicPr>
-            <a:picLocks noChangeAspect="1"/>
+            <a:picLocks noGrp="1" noChangeAspect="1"/>
           </p:cNvPicPr>
-          <p:nvPr/>
+          <p:nvPr>
+            <p:ph idx="1"/>
+          </p:nvPr>
         </p:nvPicPr>
         <p:blipFill>
           <a:blip r:embed="rId2">
@@ -3502,8 +3507,41 @@
         </p:blipFill>
         <p:spPr>
           <a:xfrm>
-            <a:off x="838200" y="1558299"/>
-            <a:ext cx="3300664" cy="4934576"/>
+            <a:off x="838200" y="1526872"/>
+            <a:ext cx="4086795" cy="2267266"/>
+          </a:xfrm>
+        </p:spPr>
+      </p:pic>
+      <p:pic>
+        <p:nvPicPr>
+          <p:cNvPr id="7" name="Picture 6" descr="A screenshot of a computer error&#10;&#10;AI-generated content may be incorrect.">
+            <a:extLst>
+              <a:ext uri="{FF2B5EF4-FFF2-40B4-BE49-F238E27FC236}">
+                <a16:creationId xmlns:a16="http://schemas.microsoft.com/office/drawing/2014/main" id="{69EE6358-5F4D-E09C-D352-988C9284477F}"/>
+              </a:ext>
+            </a:extLst>
+          </p:cNvPr>
+          <p:cNvPicPr>
+            <a:picLocks noChangeAspect="1"/>
+          </p:cNvPicPr>
+          <p:nvPr/>
+        </p:nvPicPr>
+        <p:blipFill>
+          <a:blip r:embed="rId3">
+            <a:extLst>
+              <a:ext uri="{28A0092B-C50C-407E-A947-70E740481C1C}">
+                <a14:useLocalDpi xmlns:a14="http://schemas.microsoft.com/office/drawing/2010/main" val="0"/>
+              </a:ext>
+            </a:extLst>
+          </a:blip>
+          <a:stretch>
+            <a:fillRect/>
+          </a:stretch>
+        </p:blipFill>
+        <p:spPr>
+          <a:xfrm>
+            <a:off x="5223609" y="1498293"/>
+            <a:ext cx="4086795" cy="2295845"/>
           </a:xfrm>
           <a:prstGeom prst="rect">
             <a:avLst/>
@@ -3512,10 +3550,10 @@
       </p:pic>
       <p:sp>
         <p:nvSpPr>
-          <p:cNvPr id="6" name="TextBox 5">
-            <a:extLst>
-              <a:ext uri="{FF2B5EF4-FFF2-40B4-BE49-F238E27FC236}">
-                <a16:creationId xmlns:a16="http://schemas.microsoft.com/office/drawing/2014/main" id="{1B6D636B-E82A-05D6-DB26-63C600C0C6AA}"/>
+          <p:cNvPr id="8" name="TextBox 7">
+            <a:extLst>
+              <a:ext uri="{FF2B5EF4-FFF2-40B4-BE49-F238E27FC236}">
+                <a16:creationId xmlns:a16="http://schemas.microsoft.com/office/drawing/2014/main" id="{C78B74B1-B058-36FE-E5BE-D40E055AA535}"/>
               </a:ext>
             </a:extLst>
           </p:cNvPr>
@@ -3524,8 +3562,8 @@
         </p:nvSpPr>
         <p:spPr>
           <a:xfrm>
-            <a:off x="4615543" y="1690688"/>
-            <a:ext cx="6299200" cy="2585323"/>
+            <a:off x="838200" y="3938954"/>
+            <a:ext cx="9374945" cy="1200329"/>
           </a:xfrm>
           <a:prstGeom prst="rect">
             <a:avLst/>
@@ -3540,28 +3578,15 @@
           <a:p>
             <a:r>
               <a:rPr lang="en-US" dirty="0"/>
-              <a:t>Any counter is child class of </a:t>
+              <a:t>Open and close allow access on the server device. The client can then access to server device using the </a:t>
             </a:r>
             <a:r>
               <a:rPr lang="en-US" dirty="0" err="1"/>
-              <a:t>BaseCounter</a:t>
-            </a:r>
-            <a:r>
-              <a:rPr lang="en-US" dirty="0"/>
-              <a:t> therefore must has these methods.</a:t>
-            </a:r>
-          </a:p>
-          <a:p>
-            <a:endParaRPr lang="en-US" dirty="0"/>
-          </a:p>
-          <a:p>
-            <a:r>
-              <a:rPr lang="en-US" dirty="0" err="1"/>
-              <a:t>Data_len</a:t>
-            </a:r>
-            <a:r>
-              <a:rPr lang="en-US" dirty="0"/>
-              <a:t> gives the length of returning array, default is 1</a:t>
+              <a:t>ip</a:t>
+            </a:r>
+            <a:r>
+              <a:rPr lang="en-US" dirty="0"/>
+              <a:t> and port shown above.</a:t>
             </a:r>
             <a:br>
               <a:rPr lang="en-US" dirty="0"/>
@@ -3569,23 +3594,33 @@
             <a:br>
               <a:rPr lang="en-US" dirty="0"/>
             </a:br>
-            <a:br>
-              <a:rPr lang="en-US" dirty="0"/>
-            </a:br>
-            <a:endParaRPr lang="en-US" dirty="0"/>
-          </a:p>
-          <a:p>
-            <a:endParaRPr lang="en-US" dirty="0"/>
-          </a:p>
-          <a:p>
-            <a:endParaRPr lang="en-US" dirty="0"/>
+            <a:r>
+              <a:rPr lang="en-US" dirty="0"/>
+              <a:t>The device on client side should be initialized using </a:t>
+            </a:r>
+            <a:r>
+              <a:rPr lang="en-US" dirty="0" err="1"/>
+              <a:t>RemoteDevice</a:t>
+            </a:r>
+            <a:r>
+              <a:rPr lang="en-US" dirty="0"/>
+              <a:t> class with </a:t>
+            </a:r>
+            <a:r>
+              <a:rPr lang="en-US" dirty="0" err="1"/>
+              <a:t>ip</a:t>
+            </a:r>
+            <a:r>
+              <a:rPr lang="en-US" dirty="0"/>
+              <a:t> and port. </a:t>
+            </a:r>
           </a:p>
         </p:txBody>
       </p:sp>
     </p:spTree>
     <p:extLst>
       <p:ext uri="{BB962C8B-B14F-4D97-AF65-F5344CB8AC3E}">
-        <p14:creationId xmlns:p14="http://schemas.microsoft.com/office/powerpoint/2010/main" val="2910198295"/>
+        <p14:creationId xmlns:p14="http://schemas.microsoft.com/office/powerpoint/2010/main" val="2160298866"/>
       </p:ext>
     </p:extLst>
   </p:cSld>
@@ -3614,10 +3649,10 @@
       </p:grpSpPr>
       <p:sp>
         <p:nvSpPr>
-          <p:cNvPr id="2" name="Title 1">
-            <a:extLst>
-              <a:ext uri="{FF2B5EF4-FFF2-40B4-BE49-F238E27FC236}">
-                <a16:creationId xmlns:a16="http://schemas.microsoft.com/office/drawing/2014/main" id="{6027FB5E-BA0F-4CF2-C26C-8F30718964DE}"/>
+          <p:cNvPr id="2" name="标题 1">
+            <a:extLst>
+              <a:ext uri="{FF2B5EF4-FFF2-40B4-BE49-F238E27FC236}">
+                <a16:creationId xmlns:a16="http://schemas.microsoft.com/office/drawing/2014/main" id="{F649B5E2-4C7A-F205-4042-16927A11CA2A}"/>
               </a:ext>
             </a:extLst>
           </p:cNvPr>
@@ -3634,19 +3669,18 @@
           <a:lstStyle/>
           <a:p>
             <a:r>
-              <a:rPr lang="en-US" dirty="0" err="1"/>
-              <a:t>BaseCounterNI</a:t>
-            </a:r>
-            <a:endParaRPr lang="en-US" dirty="0"/>
+              <a:rPr lang="en-US" dirty="0"/>
+              <a:t>Counter</a:t>
+            </a:r>
           </a:p>
         </p:txBody>
       </p:sp>
       <p:pic>
         <p:nvPicPr>
-          <p:cNvPr id="4" name="Picture 3" descr="A screen shot of a computer code&#10;&#10;AI-generated content may be incorrect.">
-            <a:extLst>
-              <a:ext uri="{FF2B5EF4-FFF2-40B4-BE49-F238E27FC236}">
-                <a16:creationId xmlns:a16="http://schemas.microsoft.com/office/drawing/2014/main" id="{241F4344-DC6C-5E3D-F25C-8C2DF91AD97E}"/>
+          <p:cNvPr id="5" name="Picture 4" descr="A screen shot of a computer program&#10;&#10;AI-generated content may be incorrect.">
+            <a:extLst>
+              <a:ext uri="{FF2B5EF4-FFF2-40B4-BE49-F238E27FC236}">
+                <a16:creationId xmlns:a16="http://schemas.microsoft.com/office/drawing/2014/main" id="{063FC0C7-9B64-BF52-F289-D6BA0FAB90A5}"/>
               </a:ext>
             </a:extLst>
           </p:cNvPr>
@@ -3669,8 +3703,8 @@
         </p:blipFill>
         <p:spPr>
           <a:xfrm>
-            <a:off x="932185" y="3140697"/>
-            <a:ext cx="3591426" cy="2886478"/>
+            <a:off x="838200" y="1558299"/>
+            <a:ext cx="3300664" cy="4934576"/>
           </a:xfrm>
           <a:prstGeom prst="rect">
             <a:avLst/>
@@ -3679,10 +3713,10 @@
       </p:pic>
       <p:sp>
         <p:nvSpPr>
-          <p:cNvPr id="5" name="TextBox 4">
-            <a:extLst>
-              <a:ext uri="{FF2B5EF4-FFF2-40B4-BE49-F238E27FC236}">
-                <a16:creationId xmlns:a16="http://schemas.microsoft.com/office/drawing/2014/main" id="{77B30A0E-742B-9EE2-1927-355E0557CCB1}"/>
+          <p:cNvPr id="6" name="TextBox 5">
+            <a:extLst>
+              <a:ext uri="{FF2B5EF4-FFF2-40B4-BE49-F238E27FC236}">
+                <a16:creationId xmlns:a16="http://schemas.microsoft.com/office/drawing/2014/main" id="{1B6D636B-E82A-05D6-DB26-63C600C0C6AA}"/>
               </a:ext>
             </a:extLst>
           </p:cNvPr>
@@ -3691,8 +3725,8 @@
         </p:nvSpPr>
         <p:spPr>
           <a:xfrm>
-            <a:off x="838200" y="1531031"/>
-            <a:ext cx="6299200" cy="2308324"/>
+            <a:off x="4615543" y="1690688"/>
+            <a:ext cx="6299200" cy="2585323"/>
           </a:xfrm>
           <a:prstGeom prst="rect">
             <a:avLst/>
@@ -3706,12 +3740,16 @@
           <a:lstStyle/>
           <a:p>
             <a:r>
+              <a:rPr lang="en-US" dirty="0"/>
+              <a:t>Any counter is child class of </a:t>
+            </a:r>
+            <a:r>
               <a:rPr lang="en-US" dirty="0" err="1"/>
-              <a:t>BaseCounterNI</a:t>
-            </a:r>
-            <a:r>
-              <a:rPr lang="en-US" dirty="0"/>
-              <a:t> wraps NIDAQ as counter</a:t>
+              <a:t>BaseCounter</a:t>
+            </a:r>
+            <a:r>
+              <a:rPr lang="en-US" dirty="0"/>
+              <a:t> therefore must has these methods.</a:t>
             </a:r>
           </a:p>
           <a:p>
@@ -3719,22 +3757,12 @@
           </a:p>
           <a:p>
             <a:r>
-              <a:rPr lang="en-US" dirty="0"/>
-              <a:t>Default settings are,</a:t>
-            </a:r>
-          </a:p>
-          <a:p>
-            <a:r>
               <a:rPr lang="en-US" dirty="0" err="1"/>
-              <a:t>Data_mode</a:t>
-            </a:r>
-            <a:r>
-              <a:rPr lang="en-US" dirty="0"/>
-              <a:t>: one of the </a:t>
-            </a:r>
-            <a:r>
-              <a:rPr lang="en-US" dirty="0" err="1"/>
-              <a:t>data_mode_valid</a:t>
+              <a:t>Data_len</a:t>
+            </a:r>
+            <a:r>
+              <a:rPr lang="en-US" dirty="0"/>
+              <a:t> gives the length of returning array, default is 1</a:t>
             </a:r>
             <a:br>
               <a:rPr lang="en-US" dirty="0"/>
@@ -3742,6 +3770,9 @@
             <a:br>
               <a:rPr lang="en-US" dirty="0"/>
             </a:br>
+            <a:br>
+              <a:rPr lang="en-US" dirty="0"/>
+            </a:br>
             <a:endParaRPr lang="en-US" dirty="0"/>
           </a:p>
           <a:p>
@@ -3752,94 +3783,10 @@
           </a:p>
         </p:txBody>
       </p:sp>
-      <p:sp>
-        <p:nvSpPr>
-          <p:cNvPr id="9" name="TextBox 8">
-            <a:extLst>
-              <a:ext uri="{FF2B5EF4-FFF2-40B4-BE49-F238E27FC236}">
-                <a16:creationId xmlns:a16="http://schemas.microsoft.com/office/drawing/2014/main" id="{7E5BCBF1-9F73-92B7-950D-D115E0721E47}"/>
-              </a:ext>
-            </a:extLst>
-          </p:cNvPr>
-          <p:cNvSpPr txBox="1"/>
-          <p:nvPr/>
-        </p:nvSpPr>
-        <p:spPr>
-          <a:xfrm>
-            <a:off x="5671457" y="1161699"/>
-            <a:ext cx="5069114" cy="369332"/>
-          </a:xfrm>
-          <a:prstGeom prst="rect">
-            <a:avLst/>
-          </a:prstGeom>
-          <a:noFill/>
-        </p:spPr>
-        <p:txBody>
-          <a:bodyPr wrap="square" rtlCol="0">
-            <a:spAutoFit/>
-          </a:bodyPr>
-          <a:lstStyle/>
-          <a:p>
-            <a:r>
-              <a:rPr lang="en-US" dirty="0"/>
-              <a:t>And </a:t>
-            </a:r>
-            <a:r>
-              <a:rPr lang="en-US" dirty="0" err="1"/>
-              <a:t>couter_mode</a:t>
-            </a:r>
-            <a:r>
-              <a:rPr lang="en-US" dirty="0"/>
-              <a:t> is one of </a:t>
-            </a:r>
-            <a:r>
-              <a:rPr lang="en-US" dirty="0" err="1"/>
-              <a:t>counter_mode_valid</a:t>
-            </a:r>
-            <a:endParaRPr lang="en-US" dirty="0"/>
-          </a:p>
-        </p:txBody>
-      </p:sp>
-      <p:pic>
-        <p:nvPicPr>
-          <p:cNvPr id="15" name="Picture 14">
-            <a:extLst>
-              <a:ext uri="{FF2B5EF4-FFF2-40B4-BE49-F238E27FC236}">
-                <a16:creationId xmlns:a16="http://schemas.microsoft.com/office/drawing/2014/main" id="{E4C535CA-9BEA-8774-39C5-511FFF2AD3DF}"/>
-              </a:ext>
-            </a:extLst>
-          </p:cNvPr>
-          <p:cNvPicPr>
-            <a:picLocks noChangeAspect="1"/>
-          </p:cNvPicPr>
-          <p:nvPr/>
-        </p:nvPicPr>
-        <p:blipFill>
-          <a:blip r:embed="rId3">
-            <a:extLst>
-              <a:ext uri="{28A0092B-C50C-407E-A947-70E740481C1C}">
-                <a14:useLocalDpi xmlns:a14="http://schemas.microsoft.com/office/drawing/2010/main" val="0"/>
-              </a:ext>
-            </a:extLst>
-          </a:blip>
-          <a:stretch>
-            <a:fillRect/>
-          </a:stretch>
-        </p:blipFill>
-        <p:spPr>
-          <a:xfrm>
-            <a:off x="5671457" y="1607033"/>
-            <a:ext cx="5201376" cy="190527"/>
-          </a:xfrm>
-          <a:prstGeom prst="rect">
-            <a:avLst/>
-          </a:prstGeom>
-        </p:spPr>
-      </p:pic>
     </p:spTree>
     <p:extLst>
       <p:ext uri="{BB962C8B-B14F-4D97-AF65-F5344CB8AC3E}">
-        <p14:creationId xmlns:p14="http://schemas.microsoft.com/office/powerpoint/2010/main" val="1370103536"/>
+        <p14:creationId xmlns:p14="http://schemas.microsoft.com/office/powerpoint/2010/main" val="2910198295"/>
       </p:ext>
     </p:extLst>
   </p:cSld>
@@ -3871,7 +3818,7 @@
           <p:cNvPr id="2" name="Title 1">
             <a:extLst>
               <a:ext uri="{FF2B5EF4-FFF2-40B4-BE49-F238E27FC236}">
-                <a16:creationId xmlns:a16="http://schemas.microsoft.com/office/drawing/2014/main" id="{C8258043-A794-D433-4E30-B13E7176D722}"/>
+                <a16:creationId xmlns:a16="http://schemas.microsoft.com/office/drawing/2014/main" id="{6027FB5E-BA0F-4CF2-C26C-8F30718964DE}"/>
               </a:ext>
             </a:extLst>
           </p:cNvPr>
@@ -3895,183 +3842,12 @@
           </a:p>
         </p:txBody>
       </p:sp>
-      <p:sp>
-        <p:nvSpPr>
-          <p:cNvPr id="4" name="TextBox 3">
-            <a:extLst>
-              <a:ext uri="{FF2B5EF4-FFF2-40B4-BE49-F238E27FC236}">
-                <a16:creationId xmlns:a16="http://schemas.microsoft.com/office/drawing/2014/main" id="{E905C2DA-5150-CAAB-89DE-57A613B69D83}"/>
-              </a:ext>
-            </a:extLst>
-          </p:cNvPr>
-          <p:cNvSpPr txBox="1"/>
-          <p:nvPr/>
-        </p:nvSpPr>
-        <p:spPr>
-          <a:xfrm>
-            <a:off x="896257" y="3544718"/>
-            <a:ext cx="10816772" cy="3139321"/>
-          </a:xfrm>
-          <a:prstGeom prst="rect">
-            <a:avLst/>
-          </a:prstGeom>
-          <a:noFill/>
-        </p:spPr>
-        <p:txBody>
-          <a:bodyPr wrap="square" rtlCol="0">
-            <a:spAutoFit/>
-          </a:bodyPr>
-          <a:lstStyle/>
-          <a:p>
-            <a:r>
-              <a:rPr lang="en-US" dirty="0" err="1"/>
-              <a:t>Apd</a:t>
-            </a:r>
-            <a:r>
-              <a:rPr lang="en-US" dirty="0"/>
-              <a:t>: count the edges at </a:t>
-            </a:r>
-            <a:r>
-              <a:rPr lang="en-US" dirty="0" err="1"/>
-              <a:t>apd_signal</a:t>
-            </a:r>
-            <a:r>
-              <a:rPr lang="en-US" dirty="0"/>
-              <a:t> port, with </a:t>
-            </a:r>
-            <a:r>
-              <a:rPr lang="en-US" dirty="0" err="1"/>
-              <a:t>apd_gate</a:t>
-            </a:r>
-            <a:r>
-              <a:rPr lang="en-US" dirty="0"/>
-              <a:t>, </a:t>
-            </a:r>
-            <a:r>
-              <a:rPr lang="en-US" dirty="0" err="1"/>
-              <a:t>apd_gate_ref</a:t>
-            </a:r>
-            <a:r>
-              <a:rPr lang="en-US" dirty="0"/>
-              <a:t> provide </a:t>
-            </a:r>
-            <a:r>
-              <a:rPr lang="en-US" dirty="0" err="1"/>
-              <a:t>gatings</a:t>
-            </a:r>
-            <a:r>
-              <a:rPr lang="en-US" dirty="0"/>
-              <a:t> for </a:t>
-            </a:r>
-            <a:r>
-              <a:rPr lang="en-US" dirty="0" err="1"/>
-              <a:t>data_main</a:t>
-            </a:r>
-            <a:r>
-              <a:rPr lang="en-US" dirty="0"/>
-              <a:t> and </a:t>
-            </a:r>
-            <a:r>
-              <a:rPr lang="en-US" dirty="0" err="1"/>
-              <a:t>data_ref</a:t>
-            </a:r>
-            <a:r>
-              <a:rPr lang="en-US" dirty="0"/>
-              <a:t>. Exposure is controlled by on board clock, but since exposure may not be integer times of actual pulse cycle so </a:t>
-            </a:r>
-            <a:r>
-              <a:rPr lang="en-US" dirty="0" err="1"/>
-              <a:t>apd</a:t>
-            </a:r>
-            <a:r>
-              <a:rPr lang="en-US" dirty="0"/>
-              <a:t> </a:t>
-            </a:r>
-            <a:r>
-              <a:rPr lang="en-US" dirty="0" err="1"/>
-              <a:t>data_mode</a:t>
-            </a:r>
-            <a:r>
-              <a:rPr lang="en-US" dirty="0"/>
-              <a:t> may still have counting error.</a:t>
-            </a:r>
-          </a:p>
-          <a:p>
-            <a:br>
-              <a:rPr lang="en-US" dirty="0"/>
-            </a:br>
-            <a:r>
-              <a:rPr lang="en-US" dirty="0"/>
-              <a:t>Analog: similar to </a:t>
-            </a:r>
-            <a:r>
-              <a:rPr lang="en-US" dirty="0" err="1"/>
-              <a:t>apd</a:t>
-            </a:r>
-            <a:endParaRPr lang="en-US" dirty="0"/>
-          </a:p>
-          <a:p>
-            <a:endParaRPr lang="en-US" dirty="0"/>
-          </a:p>
-          <a:p>
-            <a:r>
-              <a:rPr lang="en-US" dirty="0" err="1"/>
-              <a:t>Apd_sample</a:t>
-            </a:r>
-            <a:r>
-              <a:rPr lang="en-US" dirty="0"/>
-              <a:t>: similar to </a:t>
-            </a:r>
-            <a:r>
-              <a:rPr lang="en-US" dirty="0" err="1"/>
-              <a:t>apd</a:t>
-            </a:r>
-            <a:r>
-              <a:rPr lang="en-US" dirty="0"/>
-              <a:t> but gate using sample number which overcomes the counting error. </a:t>
-            </a:r>
-            <a:r>
-              <a:rPr lang="en-US" dirty="0" err="1"/>
-              <a:t>Apd_clock</a:t>
-            </a:r>
-            <a:r>
-              <a:rPr lang="en-US" dirty="0"/>
-              <a:t> defines how many samples are acquired which means only one </a:t>
-            </a:r>
-            <a:r>
-              <a:rPr lang="en-US" dirty="0" err="1"/>
-              <a:t>apd_clock</a:t>
-            </a:r>
-            <a:r>
-              <a:rPr lang="en-US" dirty="0"/>
-              <a:t> high signal during on complete pulse cycle.</a:t>
-            </a:r>
-          </a:p>
-          <a:p>
-            <a:endParaRPr lang="en-US" dirty="0"/>
-          </a:p>
-          <a:p>
-            <a:r>
-              <a:rPr lang="en-US" dirty="0"/>
-              <a:t>Call function </a:t>
-            </a:r>
-            <a:r>
-              <a:rPr lang="en-US" dirty="0" err="1"/>
-              <a:t>read_counts</a:t>
-            </a:r>
-            <a:r>
-              <a:rPr lang="en-US" dirty="0"/>
-              <a:t> to get counts</a:t>
-            </a:r>
-          </a:p>
-        </p:txBody>
-      </p:sp>
       <p:pic>
         <p:nvPicPr>
-          <p:cNvPr id="5" name="Picture 4" descr="A screen shot of a computer program&#10;&#10;AI-generated content may be incorrect.">
-            <a:extLst>
-              <a:ext uri="{FF2B5EF4-FFF2-40B4-BE49-F238E27FC236}">
-                <a16:creationId xmlns:a16="http://schemas.microsoft.com/office/drawing/2014/main" id="{2DB2D243-3DD1-D31D-20A5-CDC541032367}"/>
+          <p:cNvPr id="4" name="Picture 3" descr="A screen shot of a computer code&#10;&#10;AI-generated content may be incorrect.">
+            <a:extLst>
+              <a:ext uri="{FF2B5EF4-FFF2-40B4-BE49-F238E27FC236}">
+                <a16:creationId xmlns:a16="http://schemas.microsoft.com/office/drawing/2014/main" id="{241F4344-DC6C-5E3D-F25C-8C2DF91AD97E}"/>
               </a:ext>
             </a:extLst>
           </p:cNvPr>
@@ -4094,8 +3870,167 @@
         </p:blipFill>
         <p:spPr>
           <a:xfrm>
-            <a:off x="971775" y="1390365"/>
-            <a:ext cx="2905530" cy="2038635"/>
+            <a:off x="932185" y="3140697"/>
+            <a:ext cx="3591426" cy="2886478"/>
+          </a:xfrm>
+          <a:prstGeom prst="rect">
+            <a:avLst/>
+          </a:prstGeom>
+        </p:spPr>
+      </p:pic>
+      <p:sp>
+        <p:nvSpPr>
+          <p:cNvPr id="5" name="TextBox 4">
+            <a:extLst>
+              <a:ext uri="{FF2B5EF4-FFF2-40B4-BE49-F238E27FC236}">
+                <a16:creationId xmlns:a16="http://schemas.microsoft.com/office/drawing/2014/main" id="{77B30A0E-742B-9EE2-1927-355E0557CCB1}"/>
+              </a:ext>
+            </a:extLst>
+          </p:cNvPr>
+          <p:cNvSpPr txBox="1"/>
+          <p:nvPr/>
+        </p:nvSpPr>
+        <p:spPr>
+          <a:xfrm>
+            <a:off x="838200" y="1531031"/>
+            <a:ext cx="6299200" cy="2308324"/>
+          </a:xfrm>
+          <a:prstGeom prst="rect">
+            <a:avLst/>
+          </a:prstGeom>
+          <a:noFill/>
+        </p:spPr>
+        <p:txBody>
+          <a:bodyPr wrap="square" rtlCol="0">
+            <a:spAutoFit/>
+          </a:bodyPr>
+          <a:lstStyle/>
+          <a:p>
+            <a:r>
+              <a:rPr lang="en-US" dirty="0" err="1"/>
+              <a:t>BaseCounterNI</a:t>
+            </a:r>
+            <a:r>
+              <a:rPr lang="en-US" dirty="0"/>
+              <a:t> wraps NIDAQ as counter</a:t>
+            </a:r>
+          </a:p>
+          <a:p>
+            <a:endParaRPr lang="en-US" dirty="0"/>
+          </a:p>
+          <a:p>
+            <a:r>
+              <a:rPr lang="en-US" dirty="0"/>
+              <a:t>Default settings are,</a:t>
+            </a:r>
+          </a:p>
+          <a:p>
+            <a:r>
+              <a:rPr lang="en-US" dirty="0" err="1"/>
+              <a:t>Data_mode</a:t>
+            </a:r>
+            <a:r>
+              <a:rPr lang="en-US" dirty="0"/>
+              <a:t>: one of the </a:t>
+            </a:r>
+            <a:r>
+              <a:rPr lang="en-US" dirty="0" err="1"/>
+              <a:t>data_mode_valid</a:t>
+            </a:r>
+            <a:br>
+              <a:rPr lang="en-US" dirty="0"/>
+            </a:br>
+            <a:br>
+              <a:rPr lang="en-US" dirty="0"/>
+            </a:br>
+            <a:endParaRPr lang="en-US" dirty="0"/>
+          </a:p>
+          <a:p>
+            <a:endParaRPr lang="en-US" dirty="0"/>
+          </a:p>
+          <a:p>
+            <a:endParaRPr lang="en-US" dirty="0"/>
+          </a:p>
+        </p:txBody>
+      </p:sp>
+      <p:sp>
+        <p:nvSpPr>
+          <p:cNvPr id="9" name="TextBox 8">
+            <a:extLst>
+              <a:ext uri="{FF2B5EF4-FFF2-40B4-BE49-F238E27FC236}">
+                <a16:creationId xmlns:a16="http://schemas.microsoft.com/office/drawing/2014/main" id="{7E5BCBF1-9F73-92B7-950D-D115E0721E47}"/>
+              </a:ext>
+            </a:extLst>
+          </p:cNvPr>
+          <p:cNvSpPr txBox="1"/>
+          <p:nvPr/>
+        </p:nvSpPr>
+        <p:spPr>
+          <a:xfrm>
+            <a:off x="5671457" y="1161699"/>
+            <a:ext cx="5069114" cy="369332"/>
+          </a:xfrm>
+          <a:prstGeom prst="rect">
+            <a:avLst/>
+          </a:prstGeom>
+          <a:noFill/>
+        </p:spPr>
+        <p:txBody>
+          <a:bodyPr wrap="square" rtlCol="0">
+            <a:spAutoFit/>
+          </a:bodyPr>
+          <a:lstStyle/>
+          <a:p>
+            <a:r>
+              <a:rPr lang="en-US" dirty="0"/>
+              <a:t>And </a:t>
+            </a:r>
+            <a:r>
+              <a:rPr lang="en-US" dirty="0" err="1"/>
+              <a:t>couter_mode</a:t>
+            </a:r>
+            <a:r>
+              <a:rPr lang="en-US" dirty="0"/>
+              <a:t> is one of </a:t>
+            </a:r>
+            <a:r>
+              <a:rPr lang="en-US" dirty="0" err="1"/>
+              <a:t>counter_mode_valid</a:t>
+            </a:r>
+            <a:endParaRPr lang="en-US" dirty="0"/>
+          </a:p>
+        </p:txBody>
+      </p:sp>
+      <p:pic>
+        <p:nvPicPr>
+          <p:cNvPr id="15" name="Picture 14">
+            <a:extLst>
+              <a:ext uri="{FF2B5EF4-FFF2-40B4-BE49-F238E27FC236}">
+                <a16:creationId xmlns:a16="http://schemas.microsoft.com/office/drawing/2014/main" id="{E4C535CA-9BEA-8774-39C5-511FFF2AD3DF}"/>
+              </a:ext>
+            </a:extLst>
+          </p:cNvPr>
+          <p:cNvPicPr>
+            <a:picLocks noChangeAspect="1"/>
+          </p:cNvPicPr>
+          <p:nvPr/>
+        </p:nvPicPr>
+        <p:blipFill>
+          <a:blip r:embed="rId3">
+            <a:extLst>
+              <a:ext uri="{28A0092B-C50C-407E-A947-70E740481C1C}">
+                <a14:useLocalDpi xmlns:a14="http://schemas.microsoft.com/office/drawing/2010/main" val="0"/>
+              </a:ext>
+            </a:extLst>
+          </a:blip>
+          <a:stretch>
+            <a:fillRect/>
+          </a:stretch>
+        </p:blipFill>
+        <p:spPr>
+          <a:xfrm>
+            <a:off x="5671457" y="1607033"/>
+            <a:ext cx="5201376" cy="190527"/>
           </a:xfrm>
           <a:prstGeom prst="rect">
             <a:avLst/>
@@ -4105,7 +4040,7 @@
     </p:spTree>
     <p:extLst>
       <p:ext uri="{BB962C8B-B14F-4D97-AF65-F5344CB8AC3E}">
-        <p14:creationId xmlns:p14="http://schemas.microsoft.com/office/powerpoint/2010/main" val="3252540181"/>
+        <p14:creationId xmlns:p14="http://schemas.microsoft.com/office/powerpoint/2010/main" val="1370103536"/>
       </p:ext>
     </p:extLst>
   </p:cSld>
@@ -4134,6 +4069,462 @@
       </p:grpSpPr>
       <p:sp>
         <p:nvSpPr>
+          <p:cNvPr id="2" name="Title 1">
+            <a:extLst>
+              <a:ext uri="{FF2B5EF4-FFF2-40B4-BE49-F238E27FC236}">
+                <a16:creationId xmlns:a16="http://schemas.microsoft.com/office/drawing/2014/main" id="{C8258043-A794-D433-4E30-B13E7176D722}"/>
+              </a:ext>
+            </a:extLst>
+          </p:cNvPr>
+          <p:cNvSpPr>
+            <a:spLocks noGrp="1"/>
+          </p:cNvSpPr>
+          <p:nvPr>
+            <p:ph type="title"/>
+          </p:nvPr>
+        </p:nvSpPr>
+        <p:spPr/>
+        <p:txBody>
+          <a:bodyPr/>
+          <a:lstStyle/>
+          <a:p>
+            <a:r>
+              <a:rPr lang="en-US" dirty="0" err="1"/>
+              <a:t>BaseCounterNI</a:t>
+            </a:r>
+            <a:endParaRPr lang="en-US" dirty="0"/>
+          </a:p>
+        </p:txBody>
+      </p:sp>
+      <p:sp>
+        <p:nvSpPr>
+          <p:cNvPr id="4" name="TextBox 3">
+            <a:extLst>
+              <a:ext uri="{FF2B5EF4-FFF2-40B4-BE49-F238E27FC236}">
+                <a16:creationId xmlns:a16="http://schemas.microsoft.com/office/drawing/2014/main" id="{E905C2DA-5150-CAAB-89DE-57A613B69D83}"/>
+              </a:ext>
+            </a:extLst>
+          </p:cNvPr>
+          <p:cNvSpPr txBox="1"/>
+          <p:nvPr/>
+        </p:nvSpPr>
+        <p:spPr>
+          <a:xfrm>
+            <a:off x="896257" y="3544718"/>
+            <a:ext cx="10816772" cy="3139321"/>
+          </a:xfrm>
+          <a:prstGeom prst="rect">
+            <a:avLst/>
+          </a:prstGeom>
+          <a:noFill/>
+        </p:spPr>
+        <p:txBody>
+          <a:bodyPr wrap="square" rtlCol="0">
+            <a:spAutoFit/>
+          </a:bodyPr>
+          <a:lstStyle/>
+          <a:p>
+            <a:r>
+              <a:rPr lang="en-US" dirty="0" err="1"/>
+              <a:t>Apd</a:t>
+            </a:r>
+            <a:r>
+              <a:rPr lang="en-US" dirty="0"/>
+              <a:t>: count the edges at </a:t>
+            </a:r>
+            <a:r>
+              <a:rPr lang="en-US" dirty="0" err="1"/>
+              <a:t>apd_signal</a:t>
+            </a:r>
+            <a:r>
+              <a:rPr lang="en-US" dirty="0"/>
+              <a:t> port, with </a:t>
+            </a:r>
+            <a:r>
+              <a:rPr lang="en-US" dirty="0" err="1"/>
+              <a:t>apd_gate</a:t>
+            </a:r>
+            <a:r>
+              <a:rPr lang="en-US" dirty="0"/>
+              <a:t>, </a:t>
+            </a:r>
+            <a:r>
+              <a:rPr lang="en-US" dirty="0" err="1"/>
+              <a:t>apd_gate_ref</a:t>
+            </a:r>
+            <a:r>
+              <a:rPr lang="en-US" dirty="0"/>
+              <a:t> provide </a:t>
+            </a:r>
+            <a:r>
+              <a:rPr lang="en-US" dirty="0" err="1"/>
+              <a:t>gatings</a:t>
+            </a:r>
+            <a:r>
+              <a:rPr lang="en-US" dirty="0"/>
+              <a:t> for </a:t>
+            </a:r>
+            <a:r>
+              <a:rPr lang="en-US" dirty="0" err="1"/>
+              <a:t>data_main</a:t>
+            </a:r>
+            <a:r>
+              <a:rPr lang="en-US" dirty="0"/>
+              <a:t> and </a:t>
+            </a:r>
+            <a:r>
+              <a:rPr lang="en-US" dirty="0" err="1"/>
+              <a:t>data_ref</a:t>
+            </a:r>
+            <a:r>
+              <a:rPr lang="en-US" dirty="0"/>
+              <a:t>. Exposure is controlled by on board clock, but since exposure may not be integer times of actual pulse cycle so </a:t>
+            </a:r>
+            <a:r>
+              <a:rPr lang="en-US" dirty="0" err="1"/>
+              <a:t>apd</a:t>
+            </a:r>
+            <a:r>
+              <a:rPr lang="en-US" dirty="0"/>
+              <a:t> </a:t>
+            </a:r>
+            <a:r>
+              <a:rPr lang="en-US" dirty="0" err="1"/>
+              <a:t>data_mode</a:t>
+            </a:r>
+            <a:r>
+              <a:rPr lang="en-US" dirty="0"/>
+              <a:t> may still have counting error.</a:t>
+            </a:r>
+          </a:p>
+          <a:p>
+            <a:br>
+              <a:rPr lang="en-US" dirty="0"/>
+            </a:br>
+            <a:r>
+              <a:rPr lang="en-US" dirty="0"/>
+              <a:t>Analog: similar to </a:t>
+            </a:r>
+            <a:r>
+              <a:rPr lang="en-US" dirty="0" err="1"/>
+              <a:t>apd</a:t>
+            </a:r>
+            <a:endParaRPr lang="en-US" dirty="0"/>
+          </a:p>
+          <a:p>
+            <a:endParaRPr lang="en-US" dirty="0"/>
+          </a:p>
+          <a:p>
+            <a:r>
+              <a:rPr lang="en-US" dirty="0" err="1"/>
+              <a:t>Apd_sample</a:t>
+            </a:r>
+            <a:r>
+              <a:rPr lang="en-US" dirty="0"/>
+              <a:t>: similar to </a:t>
+            </a:r>
+            <a:r>
+              <a:rPr lang="en-US" dirty="0" err="1"/>
+              <a:t>apd</a:t>
+            </a:r>
+            <a:r>
+              <a:rPr lang="en-US" dirty="0"/>
+              <a:t> but gate using sample number which overcomes the counting error. </a:t>
+            </a:r>
+            <a:r>
+              <a:rPr lang="en-US" dirty="0" err="1"/>
+              <a:t>Apd_clock</a:t>
+            </a:r>
+            <a:r>
+              <a:rPr lang="en-US" dirty="0"/>
+              <a:t> defines how many samples are acquired which means only one </a:t>
+            </a:r>
+            <a:r>
+              <a:rPr lang="en-US" dirty="0" err="1"/>
+              <a:t>apd_clock</a:t>
+            </a:r>
+            <a:r>
+              <a:rPr lang="en-US" dirty="0"/>
+              <a:t> high signal during on complete pulse cycle.</a:t>
+            </a:r>
+          </a:p>
+          <a:p>
+            <a:endParaRPr lang="en-US" dirty="0"/>
+          </a:p>
+          <a:p>
+            <a:r>
+              <a:rPr lang="en-US" dirty="0"/>
+              <a:t>Call function </a:t>
+            </a:r>
+            <a:r>
+              <a:rPr lang="en-US" dirty="0" err="1"/>
+              <a:t>read_counts</a:t>
+            </a:r>
+            <a:r>
+              <a:rPr lang="en-US" dirty="0"/>
+              <a:t> to get counts</a:t>
+            </a:r>
+          </a:p>
+        </p:txBody>
+      </p:sp>
+      <p:pic>
+        <p:nvPicPr>
+          <p:cNvPr id="5" name="Picture 4" descr="A screen shot of a computer program&#10;&#10;AI-generated content may be incorrect.">
+            <a:extLst>
+              <a:ext uri="{FF2B5EF4-FFF2-40B4-BE49-F238E27FC236}">
+                <a16:creationId xmlns:a16="http://schemas.microsoft.com/office/drawing/2014/main" id="{2DB2D243-3DD1-D31D-20A5-CDC541032367}"/>
+              </a:ext>
+            </a:extLst>
+          </p:cNvPr>
+          <p:cNvPicPr>
+            <a:picLocks noChangeAspect="1"/>
+          </p:cNvPicPr>
+          <p:nvPr/>
+        </p:nvPicPr>
+        <p:blipFill>
+          <a:blip r:embed="rId2">
+            <a:extLst>
+              <a:ext uri="{28A0092B-C50C-407E-A947-70E740481C1C}">
+                <a14:useLocalDpi xmlns:a14="http://schemas.microsoft.com/office/drawing/2010/main" val="0"/>
+              </a:ext>
+            </a:extLst>
+          </a:blip>
+          <a:stretch>
+            <a:fillRect/>
+          </a:stretch>
+        </p:blipFill>
+        <p:spPr>
+          <a:xfrm>
+            <a:off x="971775" y="1390365"/>
+            <a:ext cx="2905530" cy="2038635"/>
+          </a:xfrm>
+          <a:prstGeom prst="rect">
+            <a:avLst/>
+          </a:prstGeom>
+        </p:spPr>
+      </p:pic>
+    </p:spTree>
+    <p:extLst>
+      <p:ext uri="{BB962C8B-B14F-4D97-AF65-F5344CB8AC3E}">
+        <p14:creationId xmlns:p14="http://schemas.microsoft.com/office/powerpoint/2010/main" val="3252540181"/>
+      </p:ext>
+    </p:extLst>
+  </p:cSld>
+  <p:clrMapOvr>
+    <a:masterClrMapping/>
+  </p:clrMapOvr>
+</p:sld>
+</file>
+
+<file path=ppt/slides/slide14.xml><?xml version="1.0" encoding="utf-8"?>
+<p:sld xmlns:a="http://schemas.openxmlformats.org/drawingml/2006/main" xmlns:r="http://schemas.openxmlformats.org/officeDocument/2006/relationships" xmlns:p="http://schemas.openxmlformats.org/presentationml/2006/main">
+  <p:cSld>
+    <p:spTree>
+      <p:nvGrpSpPr>
+        <p:cNvPr id="1" name=""/>
+        <p:cNvGrpSpPr/>
+        <p:nvPr/>
+      </p:nvGrpSpPr>
+      <p:grpSpPr>
+        <a:xfrm>
+          <a:off x="0" y="0"/>
+          <a:ext cx="0" cy="0"/>
+          <a:chOff x="0" y="0"/>
+          <a:chExt cx="0" cy="0"/>
+        </a:xfrm>
+      </p:grpSpPr>
+      <p:sp>
+        <p:nvSpPr>
+          <p:cNvPr id="2" name="Title 1">
+            <a:extLst>
+              <a:ext uri="{FF2B5EF4-FFF2-40B4-BE49-F238E27FC236}">
+                <a16:creationId xmlns:a16="http://schemas.microsoft.com/office/drawing/2014/main" id="{E4753298-8A7D-68EC-4104-1D1C32FB95E9}"/>
+              </a:ext>
+            </a:extLst>
+          </p:cNvPr>
+          <p:cNvSpPr>
+            <a:spLocks noGrp="1"/>
+          </p:cNvSpPr>
+          <p:nvPr>
+            <p:ph type="title"/>
+          </p:nvPr>
+        </p:nvSpPr>
+        <p:spPr/>
+        <p:txBody>
+          <a:bodyPr/>
+          <a:lstStyle/>
+          <a:p>
+            <a:r>
+              <a:rPr lang="en-US" dirty="0" err="1"/>
+              <a:t>BaseCounterNI</a:t>
+            </a:r>
+            <a:endParaRPr lang="en-US" dirty="0"/>
+          </a:p>
+        </p:txBody>
+      </p:sp>
+      <p:pic>
+        <p:nvPicPr>
+          <p:cNvPr id="5" name="Picture 4" descr="A screenshot of a computer&#10;&#10;AI-generated content may be incorrect.">
+            <a:extLst>
+              <a:ext uri="{FF2B5EF4-FFF2-40B4-BE49-F238E27FC236}">
+                <a16:creationId xmlns:a16="http://schemas.microsoft.com/office/drawing/2014/main" id="{08A2D870-7922-F705-126A-FA39A50247E8}"/>
+              </a:ext>
+            </a:extLst>
+          </p:cNvPr>
+          <p:cNvPicPr>
+            <a:picLocks noChangeAspect="1"/>
+          </p:cNvPicPr>
+          <p:nvPr/>
+        </p:nvPicPr>
+        <p:blipFill>
+          <a:blip r:embed="rId2">
+            <a:extLst>
+              <a:ext uri="{28A0092B-C50C-407E-A947-70E740481C1C}">
+                <a14:useLocalDpi xmlns:a14="http://schemas.microsoft.com/office/drawing/2010/main" val="0"/>
+              </a:ext>
+            </a:extLst>
+          </a:blip>
+          <a:stretch>
+            <a:fillRect/>
+          </a:stretch>
+        </p:blipFill>
+        <p:spPr>
+          <a:xfrm>
+            <a:off x="645015" y="1411196"/>
+            <a:ext cx="5332055" cy="2632771"/>
+          </a:xfrm>
+          <a:prstGeom prst="rect">
+            <a:avLst/>
+          </a:prstGeom>
+        </p:spPr>
+      </p:pic>
+      <p:pic>
+        <p:nvPicPr>
+          <p:cNvPr id="7" name="Picture 6" descr="A screenshot of a computer&#10;&#10;AI-generated content may be incorrect.">
+            <a:extLst>
+              <a:ext uri="{FF2B5EF4-FFF2-40B4-BE49-F238E27FC236}">
+                <a16:creationId xmlns:a16="http://schemas.microsoft.com/office/drawing/2014/main" id="{833DED00-3179-21AC-B641-A84373E4869F}"/>
+              </a:ext>
+            </a:extLst>
+          </p:cNvPr>
+          <p:cNvPicPr>
+            <a:picLocks noChangeAspect="1"/>
+          </p:cNvPicPr>
+          <p:nvPr/>
+        </p:nvPicPr>
+        <p:blipFill>
+          <a:blip r:embed="rId3">
+            <a:extLst>
+              <a:ext uri="{28A0092B-C50C-407E-A947-70E740481C1C}">
+                <a14:useLocalDpi xmlns:a14="http://schemas.microsoft.com/office/drawing/2010/main" val="0"/>
+              </a:ext>
+            </a:extLst>
+          </a:blip>
+          <a:stretch>
+            <a:fillRect/>
+          </a:stretch>
+        </p:blipFill>
+        <p:spPr>
+          <a:xfrm>
+            <a:off x="6170255" y="1428549"/>
+            <a:ext cx="5932772" cy="2616419"/>
+          </a:xfrm>
+          <a:prstGeom prst="rect">
+            <a:avLst/>
+          </a:prstGeom>
+        </p:spPr>
+      </p:pic>
+      <p:sp>
+        <p:nvSpPr>
+          <p:cNvPr id="8" name="TextBox 7">
+            <a:extLst>
+              <a:ext uri="{FF2B5EF4-FFF2-40B4-BE49-F238E27FC236}">
+                <a16:creationId xmlns:a16="http://schemas.microsoft.com/office/drawing/2014/main" id="{F4C520BD-D9F7-8FE3-CF21-C2E22A95C1EF}"/>
+              </a:ext>
+            </a:extLst>
+          </p:cNvPr>
+          <p:cNvSpPr txBox="1"/>
+          <p:nvPr/>
+        </p:nvSpPr>
+        <p:spPr>
+          <a:xfrm>
+            <a:off x="645015" y="4468969"/>
+            <a:ext cx="9065655" cy="923330"/>
+          </a:xfrm>
+          <a:prstGeom prst="rect">
+            <a:avLst/>
+          </a:prstGeom>
+          <a:noFill/>
+        </p:spPr>
+        <p:txBody>
+          <a:bodyPr wrap="square" rtlCol="0">
+            <a:spAutoFit/>
+          </a:bodyPr>
+          <a:lstStyle/>
+          <a:p>
+            <a:r>
+              <a:rPr lang="en-US" dirty="0"/>
+              <a:t>For the use of </a:t>
+            </a:r>
+            <a:r>
+              <a:rPr lang="en-US" dirty="0" err="1"/>
+              <a:t>apd_sample</a:t>
+            </a:r>
+            <a:r>
+              <a:rPr lang="en-US" dirty="0"/>
+              <a:t> </a:t>
+            </a:r>
+            <a:r>
+              <a:rPr lang="en-US" dirty="0" err="1"/>
+              <a:t>counter_mode</a:t>
+            </a:r>
+            <a:r>
+              <a:rPr lang="en-US" dirty="0"/>
+              <a:t>, you need to send a clock signal to </a:t>
+            </a:r>
+            <a:r>
+              <a:rPr lang="en-US" dirty="0" err="1"/>
+              <a:t>apd_signal</a:t>
+            </a:r>
+            <a:r>
+              <a:rPr lang="en-US" dirty="0"/>
+              <a:t> port to allow counter counts sample number. Above are two examples of valid clock settings in pulse, make sure you have only one clock signal in one complete pulse. </a:t>
+            </a:r>
+          </a:p>
+        </p:txBody>
+      </p:sp>
+    </p:spTree>
+    <p:extLst>
+      <p:ext uri="{BB962C8B-B14F-4D97-AF65-F5344CB8AC3E}">
+        <p14:creationId xmlns:p14="http://schemas.microsoft.com/office/powerpoint/2010/main" val="1603420494"/>
+      </p:ext>
+    </p:extLst>
+  </p:cSld>
+  <p:clrMapOvr>
+    <a:masterClrMapping/>
+  </p:clrMapOvr>
+</p:sld>
+</file>
+
+<file path=ppt/slides/slide15.xml><?xml version="1.0" encoding="utf-8"?>
+<p:sld xmlns:a="http://schemas.openxmlformats.org/drawingml/2006/main" xmlns:r="http://schemas.openxmlformats.org/officeDocument/2006/relationships" xmlns:p="http://schemas.openxmlformats.org/presentationml/2006/main">
+  <p:cSld>
+    <p:spTree>
+      <p:nvGrpSpPr>
+        <p:cNvPr id="1" name=""/>
+        <p:cNvGrpSpPr/>
+        <p:nvPr/>
+      </p:nvGrpSpPr>
+      <p:grpSpPr>
+        <a:xfrm>
+          <a:off x="0" y="0"/>
+          <a:ext cx="0" cy="0"/>
+          <a:chOff x="0" y="0"/>
+          <a:chExt cx="0" cy="0"/>
+        </a:xfrm>
+      </p:grpSpPr>
+      <p:sp>
+        <p:nvSpPr>
           <p:cNvPr id="2" name="标题 1">
             <a:extLst>
               <a:ext uri="{FF2B5EF4-FFF2-40B4-BE49-F238E27FC236}">
@@ -4781,7 +5172,172 @@
 </p:sld>
 </file>
 
-<file path=ppt/slides/slide14.xml><?xml version="1.0" encoding="utf-8"?>
+<file path=ppt/slides/slide16.xml><?xml version="1.0" encoding="utf-8"?>
+<p:sld xmlns:a="http://schemas.openxmlformats.org/drawingml/2006/main" xmlns:r="http://schemas.openxmlformats.org/officeDocument/2006/relationships" xmlns:p="http://schemas.openxmlformats.org/presentationml/2006/main">
+  <p:cSld>
+    <p:spTree>
+      <p:nvGrpSpPr>
+        <p:cNvPr id="1" name=""/>
+        <p:cNvGrpSpPr/>
+        <p:nvPr/>
+      </p:nvGrpSpPr>
+      <p:grpSpPr>
+        <a:xfrm>
+          <a:off x="0" y="0"/>
+          <a:ext cx="0" cy="0"/>
+          <a:chOff x="0" y="0"/>
+          <a:chExt cx="0" cy="0"/>
+        </a:xfrm>
+      </p:grpSpPr>
+      <p:sp>
+        <p:nvSpPr>
+          <p:cNvPr id="2" name="Title 1">
+            <a:extLst>
+              <a:ext uri="{FF2B5EF4-FFF2-40B4-BE49-F238E27FC236}">
+                <a16:creationId xmlns:a16="http://schemas.microsoft.com/office/drawing/2014/main" id="{4409218A-B0CD-2BE7-CC80-9781A88E441F}"/>
+              </a:ext>
+            </a:extLst>
+          </p:cNvPr>
+          <p:cNvSpPr>
+            <a:spLocks noGrp="1"/>
+          </p:cNvSpPr>
+          <p:nvPr>
+            <p:ph type="title"/>
+          </p:nvPr>
+        </p:nvSpPr>
+        <p:spPr/>
+        <p:txBody>
+          <a:bodyPr/>
+          <a:lstStyle/>
+          <a:p>
+            <a:r>
+              <a:rPr lang="en-US" dirty="0"/>
+              <a:t>Pulse</a:t>
+            </a:r>
+          </a:p>
+        </p:txBody>
+      </p:sp>
+      <p:pic>
+        <p:nvPicPr>
+          <p:cNvPr id="7" name="Picture 6" descr="A screenshot of a computer&#10;&#10;AI-generated content may be incorrect.">
+            <a:extLst>
+              <a:ext uri="{FF2B5EF4-FFF2-40B4-BE49-F238E27FC236}">
+                <a16:creationId xmlns:a16="http://schemas.microsoft.com/office/drawing/2014/main" id="{A40C0056-94B5-7412-6410-FB200D70E968}"/>
+              </a:ext>
+            </a:extLst>
+          </p:cNvPr>
+          <p:cNvPicPr>
+            <a:picLocks noChangeAspect="1"/>
+          </p:cNvPicPr>
+          <p:nvPr/>
+        </p:nvPicPr>
+        <p:blipFill>
+          <a:blip r:embed="rId2">
+            <a:extLst>
+              <a:ext uri="{28A0092B-C50C-407E-A947-70E740481C1C}">
+                <a14:useLocalDpi xmlns:a14="http://schemas.microsoft.com/office/drawing/2010/main" val="0"/>
+              </a:ext>
+            </a:extLst>
+          </a:blip>
+          <a:stretch>
+            <a:fillRect/>
+          </a:stretch>
+        </p:blipFill>
+        <p:spPr>
+          <a:xfrm>
+            <a:off x="838200" y="1480940"/>
+            <a:ext cx="5723155" cy="3738986"/>
+          </a:xfrm>
+          <a:prstGeom prst="rect">
+            <a:avLst/>
+          </a:prstGeom>
+        </p:spPr>
+      </p:pic>
+      <p:pic>
+        <p:nvPicPr>
+          <p:cNvPr id="9" name="Picture 8" descr="A screenshot of a computer&#10;&#10;AI-generated content may be incorrect.">
+            <a:extLst>
+              <a:ext uri="{FF2B5EF4-FFF2-40B4-BE49-F238E27FC236}">
+                <a16:creationId xmlns:a16="http://schemas.microsoft.com/office/drawing/2014/main" id="{8CA8CE0A-DA4D-AAAE-3C86-E51C018F2EA4}"/>
+              </a:ext>
+            </a:extLst>
+          </p:cNvPr>
+          <p:cNvPicPr>
+            <a:picLocks noChangeAspect="1"/>
+          </p:cNvPicPr>
+          <p:nvPr/>
+        </p:nvPicPr>
+        <p:blipFill>
+          <a:blip r:embed="rId3">
+            <a:extLst>
+              <a:ext uri="{28A0092B-C50C-407E-A947-70E740481C1C}">
+                <a14:useLocalDpi xmlns:a14="http://schemas.microsoft.com/office/drawing/2010/main" val="0"/>
+              </a:ext>
+            </a:extLst>
+          </a:blip>
+          <a:stretch>
+            <a:fillRect/>
+          </a:stretch>
+        </p:blipFill>
+        <p:spPr>
+          <a:xfrm>
+            <a:off x="7305408" y="1480940"/>
+            <a:ext cx="4311336" cy="3738987"/>
+          </a:xfrm>
+          <a:prstGeom prst="rect">
+            <a:avLst/>
+          </a:prstGeom>
+        </p:spPr>
+      </p:pic>
+      <p:sp>
+        <p:nvSpPr>
+          <p:cNvPr id="10" name="TextBox 9">
+            <a:extLst>
+              <a:ext uri="{FF2B5EF4-FFF2-40B4-BE49-F238E27FC236}">
+                <a16:creationId xmlns:a16="http://schemas.microsoft.com/office/drawing/2014/main" id="{9BF2901F-49BB-8ABE-B3E5-93EC977B5D57}"/>
+              </a:ext>
+            </a:extLst>
+          </p:cNvPr>
+          <p:cNvSpPr txBox="1"/>
+          <p:nvPr/>
+        </p:nvSpPr>
+        <p:spPr>
+          <a:xfrm>
+            <a:off x="838200" y="5576551"/>
+            <a:ext cx="8138375" cy="646331"/>
+          </a:xfrm>
+          <a:prstGeom prst="rect">
+            <a:avLst/>
+          </a:prstGeom>
+          <a:noFill/>
+        </p:spPr>
+        <p:txBody>
+          <a:bodyPr wrap="square" rtlCol="0">
+            <a:spAutoFit/>
+          </a:bodyPr>
+          <a:lstStyle/>
+          <a:p>
+            <a:r>
+              <a:rPr lang="en-US" dirty="0"/>
+              <a:t>Auto append ref will generate the ref pulse for you, therefore the two pulses above are equivalent.</a:t>
+            </a:r>
+          </a:p>
+        </p:txBody>
+      </p:sp>
+    </p:spTree>
+    <p:extLst>
+      <p:ext uri="{BB962C8B-B14F-4D97-AF65-F5344CB8AC3E}">
+        <p14:creationId xmlns:p14="http://schemas.microsoft.com/office/powerpoint/2010/main" val="2864636187"/>
+      </p:ext>
+    </p:extLst>
+  </p:cSld>
+  <p:clrMapOvr>
+    <a:masterClrMapping/>
+  </p:clrMapOvr>
+</p:sld>
+</file>
+
+<file path=ppt/slides/slide17.xml><?xml version="1.0" encoding="utf-8"?>
 <p:sld xmlns:a="http://schemas.openxmlformats.org/drawingml/2006/main" xmlns:r="http://schemas.openxmlformats.org/officeDocument/2006/relationships" xmlns:p="http://schemas.openxmlformats.org/presentationml/2006/main">
   <p:cSld>
     <p:spTree>
@@ -5739,10 +6295,10 @@
       </p:grpSpPr>
       <p:sp>
         <p:nvSpPr>
-          <p:cNvPr id="2" name="标题 1">
-            <a:extLst>
-              <a:ext uri="{FF2B5EF4-FFF2-40B4-BE49-F238E27FC236}">
-                <a16:creationId xmlns:a16="http://schemas.microsoft.com/office/drawing/2014/main" id="{5566FE23-92AD-2295-4B63-3E4A63F75254}"/>
+          <p:cNvPr id="2" name="Title 1">
+            <a:extLst>
+              <a:ext uri="{FF2B5EF4-FFF2-40B4-BE49-F238E27FC236}">
+                <a16:creationId xmlns:a16="http://schemas.microsoft.com/office/drawing/2014/main" id="{598920A4-9564-84FF-F587-B59C3BB1321B}"/>
               </a:ext>
             </a:extLst>
           </p:cNvPr>
@@ -5767,10 +6323,10 @@
       </p:sp>
       <p:pic>
         <p:nvPicPr>
-          <p:cNvPr id="7" name="Picture 6">
-            <a:extLst>
-              <a:ext uri="{FF2B5EF4-FFF2-40B4-BE49-F238E27FC236}">
-                <a16:creationId xmlns:a16="http://schemas.microsoft.com/office/drawing/2014/main" id="{F0EAC114-2A6D-AC53-4420-6F452F4DFB42}"/>
+          <p:cNvPr id="5" name="Picture 4" descr="A white background with black text&#10;&#10;AI-generated content may be incorrect.">
+            <a:extLst>
+              <a:ext uri="{FF2B5EF4-FFF2-40B4-BE49-F238E27FC236}">
+                <a16:creationId xmlns:a16="http://schemas.microsoft.com/office/drawing/2014/main" id="{E3F6BE4C-9085-9722-1CAD-7CE04610F197}"/>
               </a:ext>
             </a:extLst>
           </p:cNvPr>
@@ -5793,61 +6349,20 @@
         </p:blipFill>
         <p:spPr>
           <a:xfrm>
-            <a:off x="838200" y="1580256"/>
-            <a:ext cx="8982880" cy="622032"/>
+            <a:off x="838200" y="1393809"/>
+            <a:ext cx="6868484" cy="876422"/>
           </a:xfrm>
           <a:prstGeom prst="rect">
             <a:avLst/>
           </a:prstGeom>
         </p:spPr>
       </p:pic>
-      <p:cxnSp>
-        <p:nvCxnSpPr>
-          <p:cNvPr id="11" name="Straight Arrow Connector 10">
-            <a:extLst>
-              <a:ext uri="{FF2B5EF4-FFF2-40B4-BE49-F238E27FC236}">
-                <a16:creationId xmlns:a16="http://schemas.microsoft.com/office/drawing/2014/main" id="{53F95302-DC10-D509-3F34-349CFBFE2B1D}"/>
-              </a:ext>
-            </a:extLst>
-          </p:cNvPr>
-          <p:cNvCxnSpPr>
-            <a:cxnSpLocks/>
-          </p:cNvCxnSpPr>
-          <p:nvPr/>
-        </p:nvCxnSpPr>
-        <p:spPr>
-          <a:xfrm flipH="1">
-            <a:off x="1442434" y="2202288"/>
-            <a:ext cx="2923504" cy="685799"/>
-          </a:xfrm>
-          <a:prstGeom prst="straightConnector1">
-            <a:avLst/>
-          </a:prstGeom>
-          <a:ln>
-            <a:tailEnd type="triangle"/>
-          </a:ln>
-        </p:spPr>
-        <p:style>
-          <a:lnRef idx="2">
-            <a:schemeClr val="accent1"/>
-          </a:lnRef>
-          <a:fillRef idx="0">
-            <a:schemeClr val="accent1"/>
-          </a:fillRef>
-          <a:effectRef idx="1">
-            <a:schemeClr val="accent1"/>
-          </a:effectRef>
-          <a:fontRef idx="minor">
-            <a:schemeClr val="tx1"/>
-          </a:fontRef>
-        </p:style>
-      </p:cxnSp>
-      <p:sp>
-        <p:nvSpPr>
-          <p:cNvPr id="12" name="TextBox 11">
-            <a:extLst>
-              <a:ext uri="{FF2B5EF4-FFF2-40B4-BE49-F238E27FC236}">
-                <a16:creationId xmlns:a16="http://schemas.microsoft.com/office/drawing/2014/main" id="{FBBE50EE-17B6-97A4-6A3D-9DE41C6E809A}"/>
+      <p:sp>
+        <p:nvSpPr>
+          <p:cNvPr id="6" name="TextBox 5">
+            <a:extLst>
+              <a:ext uri="{FF2B5EF4-FFF2-40B4-BE49-F238E27FC236}">
+                <a16:creationId xmlns:a16="http://schemas.microsoft.com/office/drawing/2014/main" id="{9AF8DA41-B66C-EB8A-5D71-9AAD4AEDE4BA}"/>
               </a:ext>
             </a:extLst>
           </p:cNvPr>
@@ -5856,8 +6371,8 @@
         </p:nvSpPr>
         <p:spPr>
           <a:xfrm>
-            <a:off x="155620" y="2888087"/>
-            <a:ext cx="3527738" cy="646331"/>
+            <a:off x="838200" y="2691684"/>
+            <a:ext cx="7262611" cy="646331"/>
           </a:xfrm>
           <a:prstGeom prst="rect">
             <a:avLst/>
@@ -5872,7 +6387,7 @@
           <a:p>
             <a:r>
               <a:rPr lang="en-US" dirty="0"/>
-              <a:t>Pass the </a:t>
+              <a:t>Import all the devices you want into the </a:t>
             </a:r>
             <a:r>
               <a:rPr lang="en-US" dirty="0" err="1"/>
@@ -5880,61 +6395,61 @@
             </a:r>
             <a:r>
               <a:rPr lang="en-US" dirty="0"/>
-              <a:t> environment to </a:t>
+              <a:t> environment, otherwise </a:t>
             </a:r>
             <a:r>
               <a:rPr lang="en-US" dirty="0" err="1"/>
-              <a:t>device_manager</a:t>
-            </a:r>
-            <a:endParaRPr lang="en-US" dirty="0"/>
-          </a:p>
-        </p:txBody>
-      </p:sp>
-      <p:cxnSp>
-        <p:nvCxnSpPr>
-          <p:cNvPr id="15" name="Straight Arrow Connector 14">
-            <a:extLst>
-              <a:ext uri="{FF2B5EF4-FFF2-40B4-BE49-F238E27FC236}">
-                <a16:creationId xmlns:a16="http://schemas.microsoft.com/office/drawing/2014/main" id="{ADE94C4F-C2D4-73A3-95E3-FDBECBDEE8A1}"/>
-              </a:ext>
-            </a:extLst>
-          </p:cNvPr>
-          <p:cNvCxnSpPr/>
-          <p:nvPr/>
-        </p:nvCxnSpPr>
-        <p:spPr>
-          <a:xfrm flipH="1">
-            <a:off x="5821251" y="2202288"/>
-            <a:ext cx="978794" cy="811368"/>
-          </a:xfrm>
-          <a:prstGeom prst="straightConnector1">
-            <a:avLst/>
-          </a:prstGeom>
-          <a:ln>
-            <a:tailEnd type="triangle"/>
-          </a:ln>
-        </p:spPr>
-        <p:style>
-          <a:lnRef idx="2">
-            <a:schemeClr val="accent1"/>
-          </a:lnRef>
-          <a:fillRef idx="0">
-            <a:schemeClr val="accent1"/>
-          </a:fillRef>
-          <a:effectRef idx="1">
-            <a:schemeClr val="accent1"/>
-          </a:effectRef>
-          <a:fontRef idx="minor">
-            <a:schemeClr val="tx1"/>
-          </a:fontRef>
-        </p:style>
-      </p:cxnSp>
-      <p:sp>
-        <p:nvSpPr>
-          <p:cNvPr id="16" name="TextBox 15">
-            <a:extLst>
-              <a:ext uri="{FF2B5EF4-FFF2-40B4-BE49-F238E27FC236}">
-                <a16:creationId xmlns:a16="http://schemas.microsoft.com/office/drawing/2014/main" id="{833B2CE3-D491-A273-E76D-147D0558C7B6}"/>
+              <a:t>init_devices</a:t>
+            </a:r>
+            <a:r>
+              <a:rPr lang="en-US" dirty="0"/>
+              <a:t> won’t find the devices you want.</a:t>
+            </a:r>
+          </a:p>
+        </p:txBody>
+      </p:sp>
+      <p:pic>
+        <p:nvPicPr>
+          <p:cNvPr id="8" name="Picture 7" descr="A computer screen with white text&#10;&#10;AI-generated content may be incorrect.">
+            <a:extLst>
+              <a:ext uri="{FF2B5EF4-FFF2-40B4-BE49-F238E27FC236}">
+                <a16:creationId xmlns:a16="http://schemas.microsoft.com/office/drawing/2014/main" id="{C71E5EB3-97F3-2BED-E1E3-501C8749A95B}"/>
+              </a:ext>
+            </a:extLst>
+          </p:cNvPr>
+          <p:cNvPicPr>
+            <a:picLocks noChangeAspect="1"/>
+          </p:cNvPicPr>
+          <p:nvPr/>
+        </p:nvPicPr>
+        <p:blipFill>
+          <a:blip r:embed="rId3">
+            <a:extLst>
+              <a:ext uri="{28A0092B-C50C-407E-A947-70E740481C1C}">
+                <a14:useLocalDpi xmlns:a14="http://schemas.microsoft.com/office/drawing/2010/main" val="0"/>
+              </a:ext>
+            </a:extLst>
+          </a:blip>
+          <a:stretch>
+            <a:fillRect/>
+          </a:stretch>
+        </p:blipFill>
+        <p:spPr>
+          <a:xfrm>
+            <a:off x="930182" y="3519986"/>
+            <a:ext cx="7421011" cy="1305107"/>
+          </a:xfrm>
+          <a:prstGeom prst="rect">
+            <a:avLst/>
+          </a:prstGeom>
+        </p:spPr>
+      </p:pic>
+      <p:sp>
+        <p:nvSpPr>
+          <p:cNvPr id="9" name="TextBox 8">
+            <a:extLst>
+              <a:ext uri="{FF2B5EF4-FFF2-40B4-BE49-F238E27FC236}">
+                <a16:creationId xmlns:a16="http://schemas.microsoft.com/office/drawing/2014/main" id="{860ABD5B-C8BB-47FC-B9C5-F333FE8D9161}"/>
               </a:ext>
             </a:extLst>
           </p:cNvPr>
@@ -5943,8 +6458,8 @@
         </p:nvSpPr>
         <p:spPr>
           <a:xfrm>
-            <a:off x="4591318" y="3059668"/>
-            <a:ext cx="2459865" cy="1200329"/>
+            <a:off x="930182" y="5007064"/>
+            <a:ext cx="6063046" cy="1200329"/>
           </a:xfrm>
           <a:prstGeom prst="rect">
             <a:avLst/>
@@ -5959,81 +6474,23 @@
           <a:p>
             <a:r>
               <a:rPr lang="en-US" dirty="0"/>
-              <a:t>Address of the config file (support re expression), if no file use None</a:t>
-            </a:r>
-          </a:p>
-        </p:txBody>
-      </p:sp>
-      <p:cxnSp>
-        <p:nvCxnSpPr>
-          <p:cNvPr id="18" name="Straight Arrow Connector 17">
-            <a:extLst>
-              <a:ext uri="{FF2B5EF4-FFF2-40B4-BE49-F238E27FC236}">
-                <a16:creationId xmlns:a16="http://schemas.microsoft.com/office/drawing/2014/main" id="{CBD1044A-DD83-5A24-0AAB-F0C0C375526C}"/>
-              </a:ext>
-            </a:extLst>
-          </p:cNvPr>
-          <p:cNvCxnSpPr/>
-          <p:nvPr/>
-        </p:nvCxnSpPr>
-        <p:spPr>
-          <a:xfrm>
-            <a:off x="8783392" y="2202288"/>
-            <a:ext cx="476518" cy="1226712"/>
-          </a:xfrm>
-          <a:prstGeom prst="straightConnector1">
-            <a:avLst/>
-          </a:prstGeom>
-          <a:ln>
-            <a:tailEnd type="triangle"/>
-          </a:ln>
-        </p:spPr>
-        <p:style>
-          <a:lnRef idx="2">
-            <a:schemeClr val="accent1"/>
-          </a:lnRef>
-          <a:fillRef idx="0">
-            <a:schemeClr val="accent1"/>
-          </a:fillRef>
-          <a:effectRef idx="1">
-            <a:schemeClr val="accent1"/>
-          </a:effectRef>
-          <a:fontRef idx="minor">
-            <a:schemeClr val="tx1"/>
-          </a:fontRef>
-        </p:style>
-      </p:cxnSp>
-      <p:sp>
-        <p:nvSpPr>
-          <p:cNvPr id="19" name="TextBox 18">
-            <a:extLst>
-              <a:ext uri="{FF2B5EF4-FFF2-40B4-BE49-F238E27FC236}">
-                <a16:creationId xmlns:a16="http://schemas.microsoft.com/office/drawing/2014/main" id="{DCB688D0-B11D-8E08-5036-EDCC620F39EC}"/>
-              </a:ext>
-            </a:extLst>
-          </p:cNvPr>
-          <p:cNvSpPr txBox="1"/>
-          <p:nvPr/>
-        </p:nvSpPr>
-        <p:spPr>
-          <a:xfrm>
-            <a:off x="7959143" y="3490484"/>
-            <a:ext cx="2905259" cy="1200329"/>
-          </a:xfrm>
-          <a:prstGeom prst="rect">
-            <a:avLst/>
-          </a:prstGeom>
-          <a:noFill/>
-        </p:spPr>
-        <p:txBody>
-          <a:bodyPr wrap="square" rtlCol="0">
-            <a:spAutoFit/>
-          </a:bodyPr>
-          <a:lstStyle/>
-          <a:p>
-            <a:r>
-              <a:rPr lang="en-US" dirty="0"/>
-              <a:t>Open GUI to edit if you want to change or create new config, otherwise pass False</a:t>
+              <a:t>Also make sure from .</a:t>
+            </a:r>
+            <a:r>
+              <a:rPr lang="en-US" dirty="0" err="1"/>
+              <a:t>device_for_your_project</a:t>
+            </a:r>
+            <a:r>
+              <a:rPr lang="en-US" dirty="0"/>
+              <a:t> import * in the __init__.py of device submodule, and comment other device files (except </a:t>
+            </a:r>
+            <a:r>
+              <a:rPr lang="en-US" dirty="0" err="1"/>
+              <a:t>device_test</a:t>
+            </a:r>
+            <a:r>
+              <a:rPr lang="en-US" dirty="0"/>
+              <a:t>) to avoid possible name conflict</a:t>
             </a:r>
           </a:p>
         </p:txBody>
@@ -6041,7 +6498,7 @@
     </p:spTree>
     <p:extLst>
       <p:ext uri="{BB962C8B-B14F-4D97-AF65-F5344CB8AC3E}">
-        <p14:creationId xmlns:p14="http://schemas.microsoft.com/office/powerpoint/2010/main" val="2330437260"/>
+        <p14:creationId xmlns:p14="http://schemas.microsoft.com/office/powerpoint/2010/main" val="679388494"/>
       </p:ext>
     </p:extLst>
   </p:cSld>
@@ -6070,10 +6527,10 @@
       </p:grpSpPr>
       <p:sp>
         <p:nvSpPr>
-          <p:cNvPr id="2" name="Title 1">
-            <a:extLst>
-              <a:ext uri="{FF2B5EF4-FFF2-40B4-BE49-F238E27FC236}">
-                <a16:creationId xmlns:a16="http://schemas.microsoft.com/office/drawing/2014/main" id="{4D92DBBC-D9C1-9748-6340-CF0C02500877}"/>
+          <p:cNvPr id="2" name="标题 1">
+            <a:extLst>
+              <a:ext uri="{FF2B5EF4-FFF2-40B4-BE49-F238E27FC236}">
+                <a16:creationId xmlns:a16="http://schemas.microsoft.com/office/drawing/2014/main" id="{5566FE23-92AD-2295-4B63-3E4A63F75254}"/>
               </a:ext>
             </a:extLst>
           </p:cNvPr>
@@ -6098,10 +6555,10 @@
       </p:sp>
       <p:pic>
         <p:nvPicPr>
-          <p:cNvPr id="5" name="Picture 4" descr="A screenshot of a computer&#10;&#10;AI-generated content may be incorrect.">
-            <a:extLst>
-              <a:ext uri="{FF2B5EF4-FFF2-40B4-BE49-F238E27FC236}">
-                <a16:creationId xmlns:a16="http://schemas.microsoft.com/office/drawing/2014/main" id="{5D73BFB0-1F15-6234-4C82-14F11AF73A2A}"/>
+          <p:cNvPr id="7" name="Picture 6">
+            <a:extLst>
+              <a:ext uri="{FF2B5EF4-FFF2-40B4-BE49-F238E27FC236}">
+                <a16:creationId xmlns:a16="http://schemas.microsoft.com/office/drawing/2014/main" id="{F0EAC114-2A6D-AC53-4420-6F452F4DFB42}"/>
               </a:ext>
             </a:extLst>
           </p:cNvPr>
@@ -6124,8 +6581,8 @@
         </p:blipFill>
         <p:spPr>
           <a:xfrm>
-            <a:off x="668240" y="2359786"/>
-            <a:ext cx="5486701" cy="4293670"/>
+            <a:off x="838200" y="1580256"/>
+            <a:ext cx="8982880" cy="622032"/>
           </a:xfrm>
           <a:prstGeom prst="rect">
             <a:avLst/>
@@ -6134,10 +6591,10 @@
       </p:pic>
       <p:cxnSp>
         <p:nvCxnSpPr>
-          <p:cNvPr id="9" name="Straight Arrow Connector 8">
-            <a:extLst>
-              <a:ext uri="{FF2B5EF4-FFF2-40B4-BE49-F238E27FC236}">
-                <a16:creationId xmlns:a16="http://schemas.microsoft.com/office/drawing/2014/main" id="{879BDEAC-2088-1D89-8902-45DCDDDFB60E}"/>
+          <p:cNvPr id="11" name="Straight Arrow Connector 10">
+            <a:extLst>
+              <a:ext uri="{FF2B5EF4-FFF2-40B4-BE49-F238E27FC236}">
+                <a16:creationId xmlns:a16="http://schemas.microsoft.com/office/drawing/2014/main" id="{53F95302-DC10-D509-3F34-349CFBFE2B1D}"/>
               </a:ext>
             </a:extLst>
           </p:cNvPr>
@@ -6147,9 +6604,9 @@
           <p:nvPr/>
         </p:nvCxnSpPr>
         <p:spPr>
-          <a:xfrm flipH="1" flipV="1">
-            <a:off x="1674254" y="2137893"/>
-            <a:ext cx="103031" cy="679232"/>
+          <a:xfrm flipH="1">
+            <a:off x="1442434" y="2202288"/>
+            <a:ext cx="2923504" cy="685799"/>
           </a:xfrm>
           <a:prstGeom prst="straightConnector1">
             <a:avLst/>
@@ -6175,10 +6632,10 @@
       </p:cxnSp>
       <p:sp>
         <p:nvSpPr>
-          <p:cNvPr id="10" name="TextBox 9">
-            <a:extLst>
-              <a:ext uri="{FF2B5EF4-FFF2-40B4-BE49-F238E27FC236}">
-                <a16:creationId xmlns:a16="http://schemas.microsoft.com/office/drawing/2014/main" id="{C1B0FAD4-6659-137E-5807-00CE4F4F7C40}"/>
+          <p:cNvPr id="12" name="TextBox 11">
+            <a:extLst>
+              <a:ext uri="{FF2B5EF4-FFF2-40B4-BE49-F238E27FC236}">
+                <a16:creationId xmlns:a16="http://schemas.microsoft.com/office/drawing/2014/main" id="{FBBE50EE-17B6-97A4-6A3D-9DE41C6E809A}"/>
               </a:ext>
             </a:extLst>
           </p:cNvPr>
@@ -6187,8 +6644,8 @@
         </p:nvSpPr>
         <p:spPr>
           <a:xfrm>
-            <a:off x="631064" y="1491562"/>
-            <a:ext cx="3400023" cy="646331"/>
+            <a:off x="155620" y="2888087"/>
+            <a:ext cx="3527738" cy="646331"/>
           </a:xfrm>
           <a:prstGeom prst="rect">
             <a:avLst/>
@@ -6203,29 +6660,40 @@
           <a:p>
             <a:r>
               <a:rPr lang="en-US" dirty="0"/>
-              <a:t>The name you want to use for calling this device</a:t>
-            </a:r>
+              <a:t>Pass the </a:t>
+            </a:r>
+            <a:r>
+              <a:rPr lang="en-US" dirty="0" err="1"/>
+              <a:t>jupyter</a:t>
+            </a:r>
+            <a:r>
+              <a:rPr lang="en-US" dirty="0"/>
+              <a:t> environment to </a:t>
+            </a:r>
+            <a:r>
+              <a:rPr lang="en-US" dirty="0" err="1"/>
+              <a:t>device_manager</a:t>
+            </a:r>
+            <a:endParaRPr lang="en-US" dirty="0"/>
           </a:p>
         </p:txBody>
       </p:sp>
       <p:cxnSp>
         <p:nvCxnSpPr>
-          <p:cNvPr id="12" name="Straight Arrow Connector 11">
-            <a:extLst>
-              <a:ext uri="{FF2B5EF4-FFF2-40B4-BE49-F238E27FC236}">
-                <a16:creationId xmlns:a16="http://schemas.microsoft.com/office/drawing/2014/main" id="{482E1632-F6F9-3442-D25B-C471112244AB}"/>
-              </a:ext>
-            </a:extLst>
-          </p:cNvPr>
-          <p:cNvCxnSpPr>
-            <a:cxnSpLocks/>
-          </p:cNvCxnSpPr>
+          <p:cNvPr id="15" name="Straight Arrow Connector 14">
+            <a:extLst>
+              <a:ext uri="{FF2B5EF4-FFF2-40B4-BE49-F238E27FC236}">
+                <a16:creationId xmlns:a16="http://schemas.microsoft.com/office/drawing/2014/main" id="{ADE94C4F-C2D4-73A3-95E3-FDBECBDEE8A1}"/>
+              </a:ext>
+            </a:extLst>
+          </p:cNvPr>
+          <p:cNvCxnSpPr/>
           <p:nvPr/>
         </p:nvCxnSpPr>
         <p:spPr>
-          <a:xfrm flipV="1">
-            <a:off x="2962141" y="2009104"/>
-            <a:ext cx="1519707" cy="804602"/>
+          <a:xfrm flipH="1">
+            <a:off x="5821251" y="2202288"/>
+            <a:ext cx="978794" cy="811368"/>
           </a:xfrm>
           <a:prstGeom prst="straightConnector1">
             <a:avLst/>
@@ -6251,10 +6719,10 @@
       </p:cxnSp>
       <p:sp>
         <p:nvSpPr>
-          <p:cNvPr id="13" name="TextBox 12">
-            <a:extLst>
-              <a:ext uri="{FF2B5EF4-FFF2-40B4-BE49-F238E27FC236}">
-                <a16:creationId xmlns:a16="http://schemas.microsoft.com/office/drawing/2014/main" id="{15179509-F3A1-9CE5-BFB0-295E34B146A0}"/>
+          <p:cNvPr id="16" name="TextBox 15">
+            <a:extLst>
+              <a:ext uri="{FF2B5EF4-FFF2-40B4-BE49-F238E27FC236}">
+                <a16:creationId xmlns:a16="http://schemas.microsoft.com/office/drawing/2014/main" id="{833B2CE3-D491-A273-E76D-147D0558C7B6}"/>
               </a:ext>
             </a:extLst>
           </p:cNvPr>
@@ -6263,8 +6731,8 @@
         </p:nvSpPr>
         <p:spPr>
           <a:xfrm>
-            <a:off x="3875381" y="1351390"/>
-            <a:ext cx="2279560" cy="646331"/>
+            <a:off x="4591318" y="3059668"/>
+            <a:ext cx="2459865" cy="1200329"/>
           </a:xfrm>
           <a:prstGeom prst="rect">
             <a:avLst/>
@@ -6279,17 +6747,17 @@
           <a:p>
             <a:r>
               <a:rPr lang="en-US" dirty="0"/>
-              <a:t>The class name of this device</a:t>
+              <a:t>Address of the config file (support re expression), if no file use None</a:t>
             </a:r>
           </a:p>
         </p:txBody>
       </p:sp>
       <p:cxnSp>
         <p:nvCxnSpPr>
-          <p:cNvPr id="19" name="Straight Arrow Connector 18">
-            <a:extLst>
-              <a:ext uri="{FF2B5EF4-FFF2-40B4-BE49-F238E27FC236}">
-                <a16:creationId xmlns:a16="http://schemas.microsoft.com/office/drawing/2014/main" id="{F8E35788-A582-CDDF-E1BA-75DC10DFB5BF}"/>
+          <p:cNvPr id="18" name="Straight Arrow Connector 17">
+            <a:extLst>
+              <a:ext uri="{FF2B5EF4-FFF2-40B4-BE49-F238E27FC236}">
+                <a16:creationId xmlns:a16="http://schemas.microsoft.com/office/drawing/2014/main" id="{CBD1044A-DD83-5A24-0AAB-F0C0C375526C}"/>
               </a:ext>
             </a:extLst>
           </p:cNvPr>
@@ -6297,9 +6765,9 @@
           <p:nvPr/>
         </p:nvCxnSpPr>
         <p:spPr>
-          <a:xfrm flipV="1">
-            <a:off x="4893972" y="1584101"/>
-            <a:ext cx="2910625" cy="1229605"/>
+          <a:xfrm>
+            <a:off x="8783392" y="2202288"/>
+            <a:ext cx="476518" cy="1226712"/>
           </a:xfrm>
           <a:prstGeom prst="straightConnector1">
             <a:avLst/>
@@ -6325,10 +6793,10 @@
       </p:cxnSp>
       <p:sp>
         <p:nvSpPr>
-          <p:cNvPr id="20" name="TextBox 19">
-            <a:extLst>
-              <a:ext uri="{FF2B5EF4-FFF2-40B4-BE49-F238E27FC236}">
-                <a16:creationId xmlns:a16="http://schemas.microsoft.com/office/drawing/2014/main" id="{E3C77994-A10E-E1D1-C141-5CFF76027857}"/>
+          <p:cNvPr id="19" name="TextBox 18">
+            <a:extLst>
+              <a:ext uri="{FF2B5EF4-FFF2-40B4-BE49-F238E27FC236}">
+                <a16:creationId xmlns:a16="http://schemas.microsoft.com/office/drawing/2014/main" id="{DCB688D0-B11D-8E08-5036-EDCC620F39EC}"/>
               </a:ext>
             </a:extLst>
           </p:cNvPr>
@@ -6337,8 +6805,8 @@
         </p:nvSpPr>
         <p:spPr>
           <a:xfrm>
-            <a:off x="6694695" y="944794"/>
-            <a:ext cx="2704563" cy="646331"/>
+            <a:off x="7959143" y="3490484"/>
+            <a:ext cx="2905259" cy="1200329"/>
           </a:xfrm>
           <a:prstGeom prst="rect">
             <a:avLst/>
@@ -6353,90 +6821,7 @@
           <a:p>
             <a:r>
               <a:rPr lang="en-US" dirty="0"/>
-              <a:t>Params for initializing the device</a:t>
-            </a:r>
-          </a:p>
-        </p:txBody>
-      </p:sp>
-      <p:sp>
-        <p:nvSpPr>
-          <p:cNvPr id="21" name="TextBox 20">
-            <a:extLst>
-              <a:ext uri="{FF2B5EF4-FFF2-40B4-BE49-F238E27FC236}">
-                <a16:creationId xmlns:a16="http://schemas.microsoft.com/office/drawing/2014/main" id="{2D66AD8B-C5A9-329A-4355-D2DCFD2663D0}"/>
-              </a:ext>
-            </a:extLst>
-          </p:cNvPr>
-          <p:cNvSpPr txBox="1"/>
-          <p:nvPr/>
-        </p:nvSpPr>
-        <p:spPr>
-          <a:xfrm>
-            <a:off x="6787166" y="2359785"/>
-            <a:ext cx="5074276" cy="2308324"/>
-          </a:xfrm>
-          <a:prstGeom prst="rect">
-            <a:avLst/>
-          </a:prstGeom>
-          <a:noFill/>
-        </p:spPr>
-        <p:txBody>
-          <a:bodyPr wrap="square" rtlCol="0">
-            <a:spAutoFit/>
-          </a:bodyPr>
-          <a:lstStyle/>
-          <a:p>
-            <a:r>
-              <a:rPr lang="en-US" dirty="0" err="1"/>
-              <a:t>Unique_id</a:t>
-            </a:r>
-            <a:r>
-              <a:rPr lang="en-US" dirty="0"/>
-              <a:t>: None if you </a:t>
-            </a:r>
-            <a:r>
-              <a:rPr lang="en-US" dirty="0" err="1"/>
-              <a:t>dont</a:t>
-            </a:r>
-            <a:r>
-              <a:rPr lang="en-US" dirty="0"/>
-              <a:t> care about this parameter</a:t>
-            </a:r>
-            <a:br>
-              <a:rPr lang="en-US" dirty="0"/>
-            </a:br>
-            <a:r>
-              <a:rPr lang="en-US" dirty="0"/>
-              <a:t>(initialization using same device class and same </a:t>
-            </a:r>
-            <a:r>
-              <a:rPr lang="en-US" dirty="0" err="1"/>
-              <a:t>unique_id</a:t>
-            </a:r>
-            <a:r>
-              <a:rPr lang="en-US" dirty="0"/>
-              <a:t> will be treated as same device, therefore reuse the old instance or close the old instance and </a:t>
-            </a:r>
-            <a:r>
-              <a:rPr lang="en-US" dirty="0" err="1"/>
-              <a:t>reinit</a:t>
-            </a:r>
-            <a:r>
-              <a:rPr lang="en-US" dirty="0"/>
-              <a:t> with new params)</a:t>
-            </a:r>
-          </a:p>
-          <a:p>
-            <a:endParaRPr lang="en-US" dirty="0"/>
-          </a:p>
-          <a:p>
-            <a:r>
-              <a:rPr lang="en-US" dirty="0" err="1"/>
-              <a:t>Xxx_handle:reference</a:t>
-            </a:r>
-            <a:r>
-              <a:rPr lang="en-US" dirty="0"/>
-              <a:t> to other device </a:t>
+              <a:t>Open GUI to edit if you want to change or create new config, otherwise pass False</a:t>
             </a:r>
           </a:p>
         </p:txBody>
@@ -6444,7 +6829,7 @@
     </p:spTree>
     <p:extLst>
       <p:ext uri="{BB962C8B-B14F-4D97-AF65-F5344CB8AC3E}">
-        <p14:creationId xmlns:p14="http://schemas.microsoft.com/office/powerpoint/2010/main" val="3261015162"/>
+        <p14:creationId xmlns:p14="http://schemas.microsoft.com/office/powerpoint/2010/main" val="2330437260"/>
       </p:ext>
     </p:extLst>
   </p:cSld>
@@ -6476,7 +6861,7 @@
           <p:cNvPr id="2" name="Title 1">
             <a:extLst>
               <a:ext uri="{FF2B5EF4-FFF2-40B4-BE49-F238E27FC236}">
-                <a16:creationId xmlns:a16="http://schemas.microsoft.com/office/drawing/2014/main" id="{04AED238-5346-EE41-12EA-64B40981B617}"/>
+                <a16:creationId xmlns:a16="http://schemas.microsoft.com/office/drawing/2014/main" id="{4D92DBBC-D9C1-9748-6340-CF0C02500877}"/>
               </a:ext>
             </a:extLst>
           </p:cNvPr>
@@ -6504,7 +6889,7 @@
           <p:cNvPr id="5" name="Picture 4" descr="A screenshot of a computer&#10;&#10;AI-generated content may be incorrect.">
             <a:extLst>
               <a:ext uri="{FF2B5EF4-FFF2-40B4-BE49-F238E27FC236}">
-                <a16:creationId xmlns:a16="http://schemas.microsoft.com/office/drawing/2014/main" id="{3D1E255E-4447-61DA-566C-B3C67C5BFAF2}"/>
+                <a16:creationId xmlns:a16="http://schemas.microsoft.com/office/drawing/2014/main" id="{5D73BFB0-1F15-6234-4C82-14F11AF73A2A}"/>
               </a:ext>
             </a:extLst>
           </p:cNvPr>
@@ -6527,20 +6912,61 @@
         </p:blipFill>
         <p:spPr>
           <a:xfrm>
-            <a:off x="838200" y="1929796"/>
-            <a:ext cx="4978849" cy="3795756"/>
+            <a:off x="668240" y="2359786"/>
+            <a:ext cx="5486701" cy="4293670"/>
           </a:xfrm>
           <a:prstGeom prst="rect">
             <a:avLst/>
           </a:prstGeom>
         </p:spPr>
       </p:pic>
-      <p:sp>
-        <p:nvSpPr>
-          <p:cNvPr id="6" name="TextBox 5">
-            <a:extLst>
-              <a:ext uri="{FF2B5EF4-FFF2-40B4-BE49-F238E27FC236}">
-                <a16:creationId xmlns:a16="http://schemas.microsoft.com/office/drawing/2014/main" id="{798A4406-785D-3E86-A120-0CBA6B0EE8B5}"/>
+      <p:cxnSp>
+        <p:nvCxnSpPr>
+          <p:cNvPr id="9" name="Straight Arrow Connector 8">
+            <a:extLst>
+              <a:ext uri="{FF2B5EF4-FFF2-40B4-BE49-F238E27FC236}">
+                <a16:creationId xmlns:a16="http://schemas.microsoft.com/office/drawing/2014/main" id="{879BDEAC-2088-1D89-8902-45DCDDDFB60E}"/>
+              </a:ext>
+            </a:extLst>
+          </p:cNvPr>
+          <p:cNvCxnSpPr>
+            <a:cxnSpLocks/>
+          </p:cNvCxnSpPr>
+          <p:nvPr/>
+        </p:nvCxnSpPr>
+        <p:spPr>
+          <a:xfrm flipH="1" flipV="1">
+            <a:off x="1674254" y="2137893"/>
+            <a:ext cx="103031" cy="679232"/>
+          </a:xfrm>
+          <a:prstGeom prst="straightConnector1">
+            <a:avLst/>
+          </a:prstGeom>
+          <a:ln>
+            <a:tailEnd type="triangle"/>
+          </a:ln>
+        </p:spPr>
+        <p:style>
+          <a:lnRef idx="2">
+            <a:schemeClr val="accent1"/>
+          </a:lnRef>
+          <a:fillRef idx="0">
+            <a:schemeClr val="accent1"/>
+          </a:fillRef>
+          <a:effectRef idx="1">
+            <a:schemeClr val="accent1"/>
+          </a:effectRef>
+          <a:fontRef idx="minor">
+            <a:schemeClr val="tx1"/>
+          </a:fontRef>
+        </p:style>
+      </p:cxnSp>
+      <p:sp>
+        <p:nvSpPr>
+          <p:cNvPr id="10" name="TextBox 9">
+            <a:extLst>
+              <a:ext uri="{FF2B5EF4-FFF2-40B4-BE49-F238E27FC236}">
+                <a16:creationId xmlns:a16="http://schemas.microsoft.com/office/drawing/2014/main" id="{C1B0FAD4-6659-137E-5807-00CE4F4F7C40}"/>
               </a:ext>
             </a:extLst>
           </p:cNvPr>
@@ -6549,8 +6975,8 @@
         </p:nvSpPr>
         <p:spPr>
           <a:xfrm>
-            <a:off x="6358597" y="2067951"/>
-            <a:ext cx="4087979" cy="646331"/>
+            <a:off x="631064" y="1491562"/>
+            <a:ext cx="3400023" cy="646331"/>
           </a:xfrm>
           <a:prstGeom prst="rect">
             <a:avLst/>
@@ -6558,28 +6984,247 @@
           <a:noFill/>
         </p:spPr>
         <p:txBody>
-          <a:bodyPr wrap="none" rtlCol="0">
+          <a:bodyPr wrap="square" rtlCol="0">
             <a:spAutoFit/>
           </a:bodyPr>
           <a:lstStyle/>
           <a:p>
             <a:r>
               <a:rPr lang="en-US" dirty="0"/>
-              <a:t>Monitor all devices you have initialized, </a:t>
-            </a:r>
-          </a:p>
-          <a:p>
-            <a:r>
-              <a:rPr lang="en-US" dirty="0"/>
-              <a:t>or all </a:t>
-            </a:r>
+              <a:t>The name you want to use for calling this device</a:t>
+            </a:r>
+          </a:p>
+        </p:txBody>
+      </p:sp>
+      <p:cxnSp>
+        <p:nvCxnSpPr>
+          <p:cNvPr id="12" name="Straight Arrow Connector 11">
+            <a:extLst>
+              <a:ext uri="{FF2B5EF4-FFF2-40B4-BE49-F238E27FC236}">
+                <a16:creationId xmlns:a16="http://schemas.microsoft.com/office/drawing/2014/main" id="{482E1632-F6F9-3442-D25B-C471112244AB}"/>
+              </a:ext>
+            </a:extLst>
+          </p:cNvPr>
+          <p:cNvCxnSpPr>
+            <a:cxnSpLocks/>
+          </p:cNvCxnSpPr>
+          <p:nvPr/>
+        </p:nvCxnSpPr>
+        <p:spPr>
+          <a:xfrm flipV="1">
+            <a:off x="2962141" y="2009104"/>
+            <a:ext cx="1519707" cy="804602"/>
+          </a:xfrm>
+          <a:prstGeom prst="straightConnector1">
+            <a:avLst/>
+          </a:prstGeom>
+          <a:ln>
+            <a:tailEnd type="triangle"/>
+          </a:ln>
+        </p:spPr>
+        <p:style>
+          <a:lnRef idx="2">
+            <a:schemeClr val="accent1"/>
+          </a:lnRef>
+          <a:fillRef idx="0">
+            <a:schemeClr val="accent1"/>
+          </a:fillRef>
+          <a:effectRef idx="1">
+            <a:schemeClr val="accent1"/>
+          </a:effectRef>
+          <a:fontRef idx="minor">
+            <a:schemeClr val="tx1"/>
+          </a:fontRef>
+        </p:style>
+      </p:cxnSp>
+      <p:sp>
+        <p:nvSpPr>
+          <p:cNvPr id="13" name="TextBox 12">
+            <a:extLst>
+              <a:ext uri="{FF2B5EF4-FFF2-40B4-BE49-F238E27FC236}">
+                <a16:creationId xmlns:a16="http://schemas.microsoft.com/office/drawing/2014/main" id="{15179509-F3A1-9CE5-BFB0-295E34B146A0}"/>
+              </a:ext>
+            </a:extLst>
+          </p:cNvPr>
+          <p:cNvSpPr txBox="1"/>
+          <p:nvPr/>
+        </p:nvSpPr>
+        <p:spPr>
+          <a:xfrm>
+            <a:off x="3875381" y="1351390"/>
+            <a:ext cx="2279560" cy="646331"/>
+          </a:xfrm>
+          <a:prstGeom prst="rect">
+            <a:avLst/>
+          </a:prstGeom>
+          <a:noFill/>
+        </p:spPr>
+        <p:txBody>
+          <a:bodyPr wrap="square" rtlCol="0">
+            <a:spAutoFit/>
+          </a:bodyPr>
+          <a:lstStyle/>
+          <a:p>
+            <a:r>
+              <a:rPr lang="en-US" dirty="0"/>
+              <a:t>The class name of this device</a:t>
+            </a:r>
+          </a:p>
+        </p:txBody>
+      </p:sp>
+      <p:cxnSp>
+        <p:nvCxnSpPr>
+          <p:cNvPr id="19" name="Straight Arrow Connector 18">
+            <a:extLst>
+              <a:ext uri="{FF2B5EF4-FFF2-40B4-BE49-F238E27FC236}">
+                <a16:creationId xmlns:a16="http://schemas.microsoft.com/office/drawing/2014/main" id="{F8E35788-A582-CDDF-E1BA-75DC10DFB5BF}"/>
+              </a:ext>
+            </a:extLst>
+          </p:cNvPr>
+          <p:cNvCxnSpPr/>
+          <p:nvPr/>
+        </p:nvCxnSpPr>
+        <p:spPr>
+          <a:xfrm flipV="1">
+            <a:off x="4893972" y="1584101"/>
+            <a:ext cx="2910625" cy="1229605"/>
+          </a:xfrm>
+          <a:prstGeom prst="straightConnector1">
+            <a:avLst/>
+          </a:prstGeom>
+          <a:ln>
+            <a:tailEnd type="triangle"/>
+          </a:ln>
+        </p:spPr>
+        <p:style>
+          <a:lnRef idx="2">
+            <a:schemeClr val="accent1"/>
+          </a:lnRef>
+          <a:fillRef idx="0">
+            <a:schemeClr val="accent1"/>
+          </a:fillRef>
+          <a:effectRef idx="1">
+            <a:schemeClr val="accent1"/>
+          </a:effectRef>
+          <a:fontRef idx="minor">
+            <a:schemeClr val="tx1"/>
+          </a:fontRef>
+        </p:style>
+      </p:cxnSp>
+      <p:sp>
+        <p:nvSpPr>
+          <p:cNvPr id="20" name="TextBox 19">
+            <a:extLst>
+              <a:ext uri="{FF2B5EF4-FFF2-40B4-BE49-F238E27FC236}">
+                <a16:creationId xmlns:a16="http://schemas.microsoft.com/office/drawing/2014/main" id="{E3C77994-A10E-E1D1-C141-5CFF76027857}"/>
+              </a:ext>
+            </a:extLst>
+          </p:cNvPr>
+          <p:cNvSpPr txBox="1"/>
+          <p:nvPr/>
+        </p:nvSpPr>
+        <p:spPr>
+          <a:xfrm>
+            <a:off x="6694695" y="944794"/>
+            <a:ext cx="2704563" cy="646331"/>
+          </a:xfrm>
+          <a:prstGeom prst="rect">
+            <a:avLst/>
+          </a:prstGeom>
+          <a:noFill/>
+        </p:spPr>
+        <p:txBody>
+          <a:bodyPr wrap="square" rtlCol="0">
+            <a:spAutoFit/>
+          </a:bodyPr>
+          <a:lstStyle/>
+          <a:p>
+            <a:r>
+              <a:rPr lang="en-US" dirty="0"/>
+              <a:t>Params for initializing the device</a:t>
+            </a:r>
+          </a:p>
+        </p:txBody>
+      </p:sp>
+      <p:sp>
+        <p:nvSpPr>
+          <p:cNvPr id="21" name="TextBox 20">
+            <a:extLst>
+              <a:ext uri="{FF2B5EF4-FFF2-40B4-BE49-F238E27FC236}">
+                <a16:creationId xmlns:a16="http://schemas.microsoft.com/office/drawing/2014/main" id="{2D66AD8B-C5A9-329A-4355-D2DCFD2663D0}"/>
+              </a:ext>
+            </a:extLst>
+          </p:cNvPr>
+          <p:cNvSpPr txBox="1"/>
+          <p:nvPr/>
+        </p:nvSpPr>
+        <p:spPr>
+          <a:xfrm>
+            <a:off x="6787166" y="2359785"/>
+            <a:ext cx="5074276" cy="2308324"/>
+          </a:xfrm>
+          <a:prstGeom prst="rect">
+            <a:avLst/>
+          </a:prstGeom>
+          <a:noFill/>
+        </p:spPr>
+        <p:txBody>
+          <a:bodyPr wrap="square" rtlCol="0">
+            <a:spAutoFit/>
+          </a:bodyPr>
+          <a:lstStyle/>
+          <a:p>
             <a:r>
               <a:rPr lang="en-US" dirty="0" err="1"/>
-              <a:t>pyvisa</a:t>
-            </a:r>
-            <a:r>
-              <a:rPr lang="en-US" dirty="0"/>
-              <a:t> devices you have</a:t>
+              <a:t>Unique_id</a:t>
+            </a:r>
+            <a:r>
+              <a:rPr lang="en-US" dirty="0"/>
+              <a:t>: None if you </a:t>
+            </a:r>
+            <a:r>
+              <a:rPr lang="en-US" dirty="0" err="1"/>
+              <a:t>dont</a:t>
+            </a:r>
+            <a:r>
+              <a:rPr lang="en-US" dirty="0"/>
+              <a:t> care about this parameter</a:t>
+            </a:r>
+            <a:br>
+              <a:rPr lang="en-US" dirty="0"/>
+            </a:br>
+            <a:r>
+              <a:rPr lang="en-US" dirty="0"/>
+              <a:t>(initialization using same device class and same </a:t>
+            </a:r>
+            <a:r>
+              <a:rPr lang="en-US" dirty="0" err="1"/>
+              <a:t>unique_id</a:t>
+            </a:r>
+            <a:r>
+              <a:rPr lang="en-US" dirty="0"/>
+              <a:t> will be treated as same device, therefore reuse the old instance or close the old instance and </a:t>
+            </a:r>
+            <a:r>
+              <a:rPr lang="en-US" dirty="0" err="1"/>
+              <a:t>reinit</a:t>
+            </a:r>
+            <a:r>
+              <a:rPr lang="en-US" dirty="0"/>
+              <a:t> with new params)</a:t>
+            </a:r>
+          </a:p>
+          <a:p>
+            <a:endParaRPr lang="en-US" dirty="0"/>
+          </a:p>
+          <a:p>
+            <a:r>
+              <a:rPr lang="en-US" dirty="0" err="1"/>
+              <a:t>Xxx_handle:reference</a:t>
+            </a:r>
+            <a:r>
+              <a:rPr lang="en-US" dirty="0"/>
+              <a:t> to other device </a:t>
             </a:r>
           </a:p>
         </p:txBody>
@@ -6587,7 +7232,7 @@
     </p:spTree>
     <p:extLst>
       <p:ext uri="{BB962C8B-B14F-4D97-AF65-F5344CB8AC3E}">
-        <p14:creationId xmlns:p14="http://schemas.microsoft.com/office/powerpoint/2010/main" val="1902361248"/>
+        <p14:creationId xmlns:p14="http://schemas.microsoft.com/office/powerpoint/2010/main" val="3261015162"/>
       </p:ext>
     </p:extLst>
   </p:cSld>
@@ -6619,7 +7264,7 @@
           <p:cNvPr id="2" name="Title 1">
             <a:extLst>
               <a:ext uri="{FF2B5EF4-FFF2-40B4-BE49-F238E27FC236}">
-                <a16:creationId xmlns:a16="http://schemas.microsoft.com/office/drawing/2014/main" id="{9BE05ECC-0811-275B-B28E-18E6E054A235}"/>
+                <a16:creationId xmlns:a16="http://schemas.microsoft.com/office/drawing/2014/main" id="{04AED238-5346-EE41-12EA-64B40981B617}"/>
               </a:ext>
             </a:extLst>
           </p:cNvPr>
@@ -6637,17 +7282,17 @@
           <a:p>
             <a:r>
               <a:rPr lang="en-US" dirty="0"/>
-              <a:t>Init device</a:t>
+              <a:t>Init devices</a:t>
             </a:r>
           </a:p>
         </p:txBody>
       </p:sp>
       <p:pic>
         <p:nvPicPr>
-          <p:cNvPr id="5" name="Picture 4" descr="A screenshot of a computer program&#10;&#10;AI-generated content may be incorrect.">
-            <a:extLst>
-              <a:ext uri="{FF2B5EF4-FFF2-40B4-BE49-F238E27FC236}">
-                <a16:creationId xmlns:a16="http://schemas.microsoft.com/office/drawing/2014/main" id="{30BF9B88-6499-DB7C-9F8D-DB7137BB5519}"/>
+          <p:cNvPr id="5" name="Picture 4" descr="A screenshot of a computer&#10;&#10;AI-generated content may be incorrect.">
+            <a:extLst>
+              <a:ext uri="{FF2B5EF4-FFF2-40B4-BE49-F238E27FC236}">
+                <a16:creationId xmlns:a16="http://schemas.microsoft.com/office/drawing/2014/main" id="{3D1E255E-4447-61DA-566C-B3C67C5BFAF2}"/>
               </a:ext>
             </a:extLst>
           </p:cNvPr>
@@ -6670,94 +7315,67 @@
         </p:blipFill>
         <p:spPr>
           <a:xfrm>
-            <a:off x="838200" y="1690688"/>
-            <a:ext cx="4149528" cy="4598840"/>
+            <a:off x="838200" y="1929796"/>
+            <a:ext cx="4978849" cy="3795756"/>
           </a:xfrm>
           <a:prstGeom prst="rect">
             <a:avLst/>
           </a:prstGeom>
         </p:spPr>
       </p:pic>
-      <p:pic>
-        <p:nvPicPr>
-          <p:cNvPr id="7" name="Picture 6" descr="A screen shot of a computer program&#10;&#10;AI-generated content may be incorrect.">
-            <a:extLst>
-              <a:ext uri="{FF2B5EF4-FFF2-40B4-BE49-F238E27FC236}">
-                <a16:creationId xmlns:a16="http://schemas.microsoft.com/office/drawing/2014/main" id="{36089954-7607-9AB7-DE4A-08E11669078A}"/>
-              </a:ext>
-            </a:extLst>
-          </p:cNvPr>
-          <p:cNvPicPr>
-            <a:picLocks noChangeAspect="1"/>
-          </p:cNvPicPr>
-          <p:nvPr/>
-        </p:nvPicPr>
-        <p:blipFill>
-          <a:blip r:embed="rId3">
-            <a:extLst>
-              <a:ext uri="{28A0092B-C50C-407E-A947-70E740481C1C}">
-                <a14:useLocalDpi xmlns:a14="http://schemas.microsoft.com/office/drawing/2010/main" val="0"/>
-              </a:ext>
-            </a:extLst>
-          </a:blip>
-          <a:stretch>
-            <a:fillRect/>
-          </a:stretch>
-        </p:blipFill>
-        <p:spPr>
-          <a:xfrm>
-            <a:off x="5614345" y="1690688"/>
-            <a:ext cx="6257149" cy="3512377"/>
+      <p:sp>
+        <p:nvSpPr>
+          <p:cNvPr id="6" name="TextBox 5">
+            <a:extLst>
+              <a:ext uri="{FF2B5EF4-FFF2-40B4-BE49-F238E27FC236}">
+                <a16:creationId xmlns:a16="http://schemas.microsoft.com/office/drawing/2014/main" id="{798A4406-785D-3E86-A120-0CBA6B0EE8B5}"/>
+              </a:ext>
+            </a:extLst>
+          </p:cNvPr>
+          <p:cNvSpPr txBox="1"/>
+          <p:nvPr/>
+        </p:nvSpPr>
+        <p:spPr>
+          <a:xfrm>
+            <a:off x="6358597" y="2067951"/>
+            <a:ext cx="4087979" cy="646331"/>
           </a:xfrm>
           <a:prstGeom prst="rect">
             <a:avLst/>
           </a:prstGeom>
-        </p:spPr>
-      </p:pic>
-      <p:sp>
-        <p:nvSpPr>
-          <p:cNvPr id="8" name="TextBox 7">
-            <a:extLst>
-              <a:ext uri="{FF2B5EF4-FFF2-40B4-BE49-F238E27FC236}">
-                <a16:creationId xmlns:a16="http://schemas.microsoft.com/office/drawing/2014/main" id="{B4D32798-E70A-3AC4-48C5-027C8C02B75D}"/>
-              </a:ext>
-            </a:extLst>
-          </p:cNvPr>
-          <p:cNvSpPr txBox="1"/>
-          <p:nvPr/>
-        </p:nvSpPr>
-        <p:spPr>
-          <a:xfrm>
-            <a:off x="5614345" y="5585345"/>
-            <a:ext cx="5275384" cy="369332"/>
-          </a:xfrm>
-          <a:prstGeom prst="rect">
-            <a:avLst/>
-          </a:prstGeom>
           <a:noFill/>
         </p:spPr>
         <p:txBody>
-          <a:bodyPr wrap="square" rtlCol="0">
+          <a:bodyPr wrap="none" rtlCol="0">
             <a:spAutoFit/>
           </a:bodyPr>
           <a:lstStyle/>
           <a:p>
             <a:r>
               <a:rPr lang="en-US" dirty="0"/>
-              <a:t>Read the comment on </a:t>
+              <a:t>Monitor all devices you have initialized, </a:t>
+            </a:r>
+          </a:p>
+          <a:p>
+            <a:r>
+              <a:rPr lang="en-US" dirty="0"/>
+              <a:t>or all </a:t>
             </a:r>
             <a:r>
               <a:rPr lang="en-US" dirty="0" err="1"/>
-              <a:t>ManagedProperty</a:t>
-            </a:r>
-            <a:endParaRPr lang="en-US" dirty="0"/>
+              <a:t>pyvisa</a:t>
+            </a:r>
+            <a:r>
+              <a:rPr lang="en-US" dirty="0"/>
+              <a:t> devices you have</a:t>
+            </a:r>
           </a:p>
         </p:txBody>
       </p:sp>
     </p:spTree>
     <p:extLst>
       <p:ext uri="{BB962C8B-B14F-4D97-AF65-F5344CB8AC3E}">
-        <p14:creationId xmlns:p14="http://schemas.microsoft.com/office/powerpoint/2010/main" val="1176291460"/>
+        <p14:creationId xmlns:p14="http://schemas.microsoft.com/office/powerpoint/2010/main" val="1902361248"/>
       </p:ext>
     </p:extLst>
   </p:cSld>
@@ -6786,10 +7404,10 @@
       </p:grpSpPr>
       <p:sp>
         <p:nvSpPr>
-          <p:cNvPr id="2" name="标题 1">
-            <a:extLst>
-              <a:ext uri="{FF2B5EF4-FFF2-40B4-BE49-F238E27FC236}">
-                <a16:creationId xmlns:a16="http://schemas.microsoft.com/office/drawing/2014/main" id="{A07693D2-400C-F62D-ABEB-53A468DA0A23}"/>
+          <p:cNvPr id="2" name="Title 1">
+            <a:extLst>
+              <a:ext uri="{FF2B5EF4-FFF2-40B4-BE49-F238E27FC236}">
+                <a16:creationId xmlns:a16="http://schemas.microsoft.com/office/drawing/2014/main" id="{9BE05ECC-0811-275B-B28E-18E6E054A235}"/>
               </a:ext>
             </a:extLst>
           </p:cNvPr>
@@ -6807,17 +7425,17 @@
           <a:p>
             <a:r>
               <a:rPr lang="en-US" dirty="0"/>
-              <a:t>Device GUI</a:t>
+              <a:t>Init device</a:t>
             </a:r>
           </a:p>
         </p:txBody>
       </p:sp>
       <p:pic>
         <p:nvPicPr>
-          <p:cNvPr id="5" name="Picture 4">
-            <a:extLst>
-              <a:ext uri="{FF2B5EF4-FFF2-40B4-BE49-F238E27FC236}">
-                <a16:creationId xmlns:a16="http://schemas.microsoft.com/office/drawing/2014/main" id="{B6076A6C-3D25-181A-86BB-7DDE0C819E4A}"/>
+          <p:cNvPr id="5" name="Picture 4" descr="A screenshot of a computer program&#10;&#10;AI-generated content may be incorrect.">
+            <a:extLst>
+              <a:ext uri="{FF2B5EF4-FFF2-40B4-BE49-F238E27FC236}">
+                <a16:creationId xmlns:a16="http://schemas.microsoft.com/office/drawing/2014/main" id="{30BF9B88-6499-DB7C-9F8D-DB7137BB5519}"/>
               </a:ext>
             </a:extLst>
           </p:cNvPr>
@@ -6840,8 +7458,8 @@
         </p:blipFill>
         <p:spPr>
           <a:xfrm>
-            <a:off x="9266361" y="656766"/>
-            <a:ext cx="1442747" cy="515266"/>
+            <a:off x="838200" y="1690688"/>
+            <a:ext cx="4149528" cy="4598840"/>
           </a:xfrm>
           <a:prstGeom prst="rect">
             <a:avLst/>
@@ -6850,10 +7468,10 @@
       </p:pic>
       <p:pic>
         <p:nvPicPr>
-          <p:cNvPr id="7" name="Picture 6" descr="A screenshot of a computer&#10;&#10;AI-generated content may be incorrect.">
-            <a:extLst>
-              <a:ext uri="{FF2B5EF4-FFF2-40B4-BE49-F238E27FC236}">
-                <a16:creationId xmlns:a16="http://schemas.microsoft.com/office/drawing/2014/main" id="{F27A6394-856A-82F0-EDAD-6088C0161ACC}"/>
+          <p:cNvPr id="7" name="Picture 6" descr="A screen shot of a computer program&#10;&#10;AI-generated content may be incorrect.">
+            <a:extLst>
+              <a:ext uri="{FF2B5EF4-FFF2-40B4-BE49-F238E27FC236}">
+                <a16:creationId xmlns:a16="http://schemas.microsoft.com/office/drawing/2014/main" id="{36089954-7607-9AB7-DE4A-08E11669078A}"/>
               </a:ext>
             </a:extLst>
           </p:cNvPr>
@@ -6876,8 +7494,8 @@
         </p:blipFill>
         <p:spPr>
           <a:xfrm>
-            <a:off x="3367676" y="1804866"/>
-            <a:ext cx="5898685" cy="4688009"/>
+            <a:off x="5614345" y="1690688"/>
+            <a:ext cx="6257149" cy="3512377"/>
           </a:xfrm>
           <a:prstGeom prst="rect">
             <a:avLst/>
@@ -6886,10 +7504,10 @@
       </p:pic>
       <p:sp>
         <p:nvSpPr>
-          <p:cNvPr id="9" name="TextBox 8">
-            <a:extLst>
-              <a:ext uri="{FF2B5EF4-FFF2-40B4-BE49-F238E27FC236}">
-                <a16:creationId xmlns:a16="http://schemas.microsoft.com/office/drawing/2014/main" id="{5C4E34DB-D2E4-27BE-B8D8-8E6E666A5F7B}"/>
+          <p:cNvPr id="8" name="TextBox 7">
+            <a:extLst>
+              <a:ext uri="{FF2B5EF4-FFF2-40B4-BE49-F238E27FC236}">
+                <a16:creationId xmlns:a16="http://schemas.microsoft.com/office/drawing/2014/main" id="{B4D32798-E70A-3AC4-48C5-027C8C02B75D}"/>
               </a:ext>
             </a:extLst>
           </p:cNvPr>
@@ -6898,166 +7516,8 @@
         </p:nvSpPr>
         <p:spPr>
           <a:xfrm>
-            <a:off x="5331655" y="729733"/>
-            <a:ext cx="3726789" cy="369332"/>
-          </a:xfrm>
-          <a:prstGeom prst="rect">
-            <a:avLst/>
-          </a:prstGeom>
-          <a:noFill/>
-        </p:spPr>
-        <p:txBody>
-          <a:bodyPr wrap="none" rtlCol="0">
-            <a:spAutoFit/>
-          </a:bodyPr>
-          <a:lstStyle/>
-          <a:p>
-            <a:r>
-              <a:rPr lang="en-US" dirty="0"/>
-              <a:t>Once you have the device, call .</a:t>
-            </a:r>
-            <a:r>
-              <a:rPr lang="en-US" dirty="0" err="1"/>
-              <a:t>gui</a:t>
-            </a:r>
-            <a:r>
-              <a:rPr lang="en-US" dirty="0"/>
-              <a:t>()</a:t>
-            </a:r>
-          </a:p>
-        </p:txBody>
-      </p:sp>
-      <p:cxnSp>
-        <p:nvCxnSpPr>
-          <p:cNvPr id="11" name="Straight Arrow Connector 10">
-            <a:extLst>
-              <a:ext uri="{FF2B5EF4-FFF2-40B4-BE49-F238E27FC236}">
-                <a16:creationId xmlns:a16="http://schemas.microsoft.com/office/drawing/2014/main" id="{47943412-DE93-42AF-5ADA-0DB2188402F9}"/>
-              </a:ext>
-            </a:extLst>
-          </p:cNvPr>
-          <p:cNvCxnSpPr/>
-          <p:nvPr/>
-        </p:nvCxnSpPr>
-        <p:spPr>
-          <a:xfrm flipH="1" flipV="1">
-            <a:off x="1842868" y="2250831"/>
-            <a:ext cx="1716258" cy="267286"/>
-          </a:xfrm>
-          <a:prstGeom prst="straightConnector1">
-            <a:avLst/>
-          </a:prstGeom>
-          <a:ln>
-            <a:tailEnd type="triangle"/>
-          </a:ln>
-        </p:spPr>
-        <p:style>
-          <a:lnRef idx="2">
-            <a:schemeClr val="accent1"/>
-          </a:lnRef>
-          <a:fillRef idx="0">
-            <a:schemeClr val="accent1"/>
-          </a:fillRef>
-          <a:effectRef idx="1">
-            <a:schemeClr val="accent1"/>
-          </a:effectRef>
-          <a:fontRef idx="minor">
-            <a:schemeClr val="tx1"/>
-          </a:fontRef>
-        </p:style>
-      </p:cxnSp>
-      <p:sp>
-        <p:nvSpPr>
-          <p:cNvPr id="12" name="TextBox 11">
-            <a:extLst>
-              <a:ext uri="{FF2B5EF4-FFF2-40B4-BE49-F238E27FC236}">
-                <a16:creationId xmlns:a16="http://schemas.microsoft.com/office/drawing/2014/main" id="{C1F3A464-BFEE-64D6-6985-EC15FD54C1B0}"/>
-              </a:ext>
-            </a:extLst>
-          </p:cNvPr>
-          <p:cNvSpPr txBox="1"/>
-          <p:nvPr/>
-        </p:nvSpPr>
-        <p:spPr>
-          <a:xfrm>
-            <a:off x="249194" y="1881499"/>
-            <a:ext cx="3187347" cy="369332"/>
-          </a:xfrm>
-          <a:prstGeom prst="rect">
-            <a:avLst/>
-          </a:prstGeom>
-          <a:noFill/>
-        </p:spPr>
-        <p:txBody>
-          <a:bodyPr wrap="none" rtlCol="0">
-            <a:spAutoFit/>
-          </a:bodyPr>
-          <a:lstStyle/>
-          <a:p>
-            <a:r>
-              <a:rPr lang="en-US" dirty="0"/>
-              <a:t>Check remote devices section</a:t>
-            </a:r>
-          </a:p>
-        </p:txBody>
-      </p:sp>
-      <p:cxnSp>
-        <p:nvCxnSpPr>
-          <p:cNvPr id="14" name="Straight Arrow Connector 13">
-            <a:extLst>
-              <a:ext uri="{FF2B5EF4-FFF2-40B4-BE49-F238E27FC236}">
-                <a16:creationId xmlns:a16="http://schemas.microsoft.com/office/drawing/2014/main" id="{CE3EEDB2-26EF-2A5C-78BE-5A447F2ECC3C}"/>
-              </a:ext>
-            </a:extLst>
-          </p:cNvPr>
-          <p:cNvCxnSpPr>
-            <a:cxnSpLocks/>
-          </p:cNvCxnSpPr>
-          <p:nvPr/>
-        </p:nvCxnSpPr>
-        <p:spPr>
-          <a:xfrm flipH="1" flipV="1">
-            <a:off x="2562896" y="3876541"/>
-            <a:ext cx="996230" cy="272329"/>
-          </a:xfrm>
-          <a:prstGeom prst="straightConnector1">
-            <a:avLst/>
-          </a:prstGeom>
-          <a:ln>
-            <a:tailEnd type="triangle"/>
-          </a:ln>
-        </p:spPr>
-        <p:style>
-          <a:lnRef idx="2">
-            <a:schemeClr val="accent1"/>
-          </a:lnRef>
-          <a:fillRef idx="0">
-            <a:schemeClr val="accent1"/>
-          </a:fillRef>
-          <a:effectRef idx="1">
-            <a:schemeClr val="accent1"/>
-          </a:effectRef>
-          <a:fontRef idx="minor">
-            <a:schemeClr val="tx1"/>
-          </a:fontRef>
-        </p:style>
-      </p:cxnSp>
-      <p:sp>
-        <p:nvSpPr>
-          <p:cNvPr id="15" name="TextBox 14">
-            <a:extLst>
-              <a:ext uri="{FF2B5EF4-FFF2-40B4-BE49-F238E27FC236}">
-                <a16:creationId xmlns:a16="http://schemas.microsoft.com/office/drawing/2014/main" id="{C0F80C07-B11A-45EE-E7DD-ECC4CF61C3BB}"/>
-              </a:ext>
-            </a:extLst>
-          </p:cNvPr>
-          <p:cNvSpPr txBox="1"/>
-          <p:nvPr/>
-        </p:nvSpPr>
-        <p:spPr>
-          <a:xfrm>
-            <a:off x="298349" y="2946043"/>
-            <a:ext cx="2627290" cy="1200329"/>
+            <a:off x="5614345" y="5585345"/>
+            <a:ext cx="5275384" cy="369332"/>
           </a:xfrm>
           <a:prstGeom prst="rect">
             <a:avLst/>
@@ -7072,173 +7532,20 @@
           <a:p>
             <a:r>
               <a:rPr lang="en-US" dirty="0"/>
-              <a:t>If the device is interrupted by external , normally you don’t need to care about this</a:t>
-            </a:r>
-          </a:p>
-        </p:txBody>
-      </p:sp>
-      <p:cxnSp>
-        <p:nvCxnSpPr>
-          <p:cNvPr id="18" name="Straight Arrow Connector 17">
-            <a:extLst>
-              <a:ext uri="{FF2B5EF4-FFF2-40B4-BE49-F238E27FC236}">
-                <a16:creationId xmlns:a16="http://schemas.microsoft.com/office/drawing/2014/main" id="{32A21CCF-D016-96CD-2B0E-8CFC43DD5537}"/>
-              </a:ext>
-            </a:extLst>
-          </p:cNvPr>
-          <p:cNvCxnSpPr/>
-          <p:nvPr/>
-        </p:nvCxnSpPr>
-        <p:spPr>
-          <a:xfrm flipH="1">
-            <a:off x="1842867" y="5589431"/>
-            <a:ext cx="1593674" cy="0"/>
-          </a:xfrm>
-          <a:prstGeom prst="straightConnector1">
-            <a:avLst/>
-          </a:prstGeom>
-          <a:ln>
-            <a:tailEnd type="triangle"/>
-          </a:ln>
-        </p:spPr>
-        <p:style>
-          <a:lnRef idx="2">
-            <a:schemeClr val="accent1"/>
-          </a:lnRef>
-          <a:fillRef idx="0">
-            <a:schemeClr val="accent1"/>
-          </a:fillRef>
-          <a:effectRef idx="1">
-            <a:schemeClr val="accent1"/>
-          </a:effectRef>
-          <a:fontRef idx="minor">
-            <a:schemeClr val="tx1"/>
-          </a:fontRef>
-        </p:style>
-      </p:cxnSp>
-      <p:sp>
-        <p:nvSpPr>
-          <p:cNvPr id="19" name="TextBox 18">
-            <a:extLst>
-              <a:ext uri="{FF2B5EF4-FFF2-40B4-BE49-F238E27FC236}">
-                <a16:creationId xmlns:a16="http://schemas.microsoft.com/office/drawing/2014/main" id="{65851BEC-AE4C-9917-A23D-32315EA15669}"/>
-              </a:ext>
-            </a:extLst>
-          </p:cNvPr>
-          <p:cNvSpPr txBox="1"/>
-          <p:nvPr/>
-        </p:nvSpPr>
-        <p:spPr>
-          <a:xfrm>
-            <a:off x="249194" y="5127766"/>
-            <a:ext cx="1697893" cy="923330"/>
-          </a:xfrm>
-          <a:prstGeom prst="rect">
-            <a:avLst/>
-          </a:prstGeom>
-          <a:noFill/>
-        </p:spPr>
-        <p:txBody>
-          <a:bodyPr wrap="square" rtlCol="0">
-            <a:spAutoFit/>
-          </a:bodyPr>
-          <a:lstStyle/>
-          <a:p>
-            <a:r>
-              <a:rPr lang="en-US" dirty="0"/>
-              <a:t>Set by </a:t>
+              <a:t>Read the comment on </a:t>
             </a:r>
             <a:r>
               <a:rPr lang="en-US" dirty="0" err="1"/>
-              <a:t>frequency_lb</a:t>
-            </a:r>
-            <a:r>
-              <a:rPr lang="en-US" dirty="0"/>
-              <a:t>, </a:t>
-            </a:r>
-            <a:r>
-              <a:rPr lang="en-US" dirty="0" err="1"/>
-              <a:t>frequency_ub</a:t>
+              <a:t>ManagedProperty</a:t>
             </a:r>
             <a:endParaRPr lang="en-US" dirty="0"/>
-          </a:p>
-        </p:txBody>
-      </p:sp>
-      <p:pic>
-        <p:nvPicPr>
-          <p:cNvPr id="21" name="Picture 20" descr="A screenshot of a computer&#10;&#10;AI-generated content may be incorrect.">
-            <a:extLst>
-              <a:ext uri="{FF2B5EF4-FFF2-40B4-BE49-F238E27FC236}">
-                <a16:creationId xmlns:a16="http://schemas.microsoft.com/office/drawing/2014/main" id="{4D72A41B-17CE-6AF0-FA72-6EEC0DB3B623}"/>
-              </a:ext>
-            </a:extLst>
-          </p:cNvPr>
-          <p:cNvPicPr>
-            <a:picLocks noChangeAspect="1"/>
-          </p:cNvPicPr>
-          <p:nvPr/>
-        </p:nvPicPr>
-        <p:blipFill>
-          <a:blip r:embed="rId4">
-            <a:extLst>
-              <a:ext uri="{28A0092B-C50C-407E-A947-70E740481C1C}">
-                <a14:useLocalDpi xmlns:a14="http://schemas.microsoft.com/office/drawing/2010/main" val="0"/>
-              </a:ext>
-            </a:extLst>
-          </a:blip>
-          <a:stretch>
-            <a:fillRect/>
-          </a:stretch>
-        </p:blipFill>
-        <p:spPr>
-          <a:xfrm>
-            <a:off x="9680986" y="1755233"/>
-            <a:ext cx="1200318" cy="1047896"/>
-          </a:xfrm>
-          <a:prstGeom prst="rect">
-            <a:avLst/>
-          </a:prstGeom>
-        </p:spPr>
-      </p:pic>
-      <p:sp>
-        <p:nvSpPr>
-          <p:cNvPr id="22" name="TextBox 21">
-            <a:extLst>
-              <a:ext uri="{FF2B5EF4-FFF2-40B4-BE49-F238E27FC236}">
-                <a16:creationId xmlns:a16="http://schemas.microsoft.com/office/drawing/2014/main" id="{ADCF8A5F-83A6-1B42-160C-2A365E1C4137}"/>
-              </a:ext>
-            </a:extLst>
-          </p:cNvPr>
-          <p:cNvSpPr txBox="1"/>
-          <p:nvPr/>
-        </p:nvSpPr>
-        <p:spPr>
-          <a:xfrm>
-            <a:off x="9708398" y="2946043"/>
-            <a:ext cx="1884242" cy="1477328"/>
-          </a:xfrm>
-          <a:prstGeom prst="rect">
-            <a:avLst/>
-          </a:prstGeom>
-          <a:noFill/>
-        </p:spPr>
-        <p:txBody>
-          <a:bodyPr wrap="square" rtlCol="0">
-            <a:spAutoFit/>
-          </a:bodyPr>
-          <a:lstStyle/>
-          <a:p>
-            <a:r>
-              <a:rPr lang="en-US" dirty="0"/>
-              <a:t>You can also access/change the property of device in non-GUI way</a:t>
-            </a:r>
           </a:p>
         </p:txBody>
       </p:sp>
     </p:spTree>
     <p:extLst>
       <p:ext uri="{BB962C8B-B14F-4D97-AF65-F5344CB8AC3E}">
-        <p14:creationId xmlns:p14="http://schemas.microsoft.com/office/powerpoint/2010/main" val="309546426"/>
+        <p14:creationId xmlns:p14="http://schemas.microsoft.com/office/powerpoint/2010/main" val="1176291460"/>
       </p:ext>
     </p:extLst>
   </p:cSld>
@@ -7267,10 +7574,10 @@
       </p:grpSpPr>
       <p:sp>
         <p:nvSpPr>
-          <p:cNvPr id="2" name="Title 1">
-            <a:extLst>
-              <a:ext uri="{FF2B5EF4-FFF2-40B4-BE49-F238E27FC236}">
-                <a16:creationId xmlns:a16="http://schemas.microsoft.com/office/drawing/2014/main" id="{15CC32D6-6EDD-8C21-0412-E888AE7FC482}"/>
+          <p:cNvPr id="2" name="标题 1">
+            <a:extLst>
+              <a:ext uri="{FF2B5EF4-FFF2-40B4-BE49-F238E27FC236}">
+                <a16:creationId xmlns:a16="http://schemas.microsoft.com/office/drawing/2014/main" id="{A07693D2-400C-F62D-ABEB-53A468DA0A23}"/>
               </a:ext>
             </a:extLst>
           </p:cNvPr>
@@ -7288,17 +7595,17 @@
           <a:p>
             <a:r>
               <a:rPr lang="en-US" dirty="0"/>
-              <a:t>Remote device</a:t>
+              <a:t>Device GUI</a:t>
             </a:r>
           </a:p>
         </p:txBody>
       </p:sp>
       <p:pic>
         <p:nvPicPr>
-          <p:cNvPr id="6" name="Picture 5" descr="A screenshot of a computer&#10;&#10;AI-generated content may be incorrect.">
-            <a:extLst>
-              <a:ext uri="{FF2B5EF4-FFF2-40B4-BE49-F238E27FC236}">
-                <a16:creationId xmlns:a16="http://schemas.microsoft.com/office/drawing/2014/main" id="{99E0E41E-0E17-2F5E-72DB-597376FFE5AF}"/>
+          <p:cNvPr id="5" name="Picture 4">
+            <a:extLst>
+              <a:ext uri="{FF2B5EF4-FFF2-40B4-BE49-F238E27FC236}">
+                <a16:creationId xmlns:a16="http://schemas.microsoft.com/office/drawing/2014/main" id="{B6076A6C-3D25-181A-86BB-7DDE0C819E4A}"/>
               </a:ext>
             </a:extLst>
           </p:cNvPr>
@@ -7321,20 +7628,56 @@
         </p:blipFill>
         <p:spPr>
           <a:xfrm>
-            <a:off x="838200" y="1504627"/>
-            <a:ext cx="7020905" cy="1381318"/>
+            <a:off x="9266361" y="656766"/>
+            <a:ext cx="1442747" cy="515266"/>
           </a:xfrm>
           <a:prstGeom prst="rect">
             <a:avLst/>
           </a:prstGeom>
         </p:spPr>
       </p:pic>
-      <p:sp>
-        <p:nvSpPr>
-          <p:cNvPr id="7" name="TextBox 6">
-            <a:extLst>
-              <a:ext uri="{FF2B5EF4-FFF2-40B4-BE49-F238E27FC236}">
-                <a16:creationId xmlns:a16="http://schemas.microsoft.com/office/drawing/2014/main" id="{E1F829AF-CE25-66BD-9694-F692B2512320}"/>
+      <p:pic>
+        <p:nvPicPr>
+          <p:cNvPr id="7" name="Picture 6" descr="A screenshot of a computer&#10;&#10;AI-generated content may be incorrect.">
+            <a:extLst>
+              <a:ext uri="{FF2B5EF4-FFF2-40B4-BE49-F238E27FC236}">
+                <a16:creationId xmlns:a16="http://schemas.microsoft.com/office/drawing/2014/main" id="{F27A6394-856A-82F0-EDAD-6088C0161ACC}"/>
+              </a:ext>
+            </a:extLst>
+          </p:cNvPr>
+          <p:cNvPicPr>
+            <a:picLocks noChangeAspect="1"/>
+          </p:cNvPicPr>
+          <p:nvPr/>
+        </p:nvPicPr>
+        <p:blipFill>
+          <a:blip r:embed="rId3">
+            <a:extLst>
+              <a:ext uri="{28A0092B-C50C-407E-A947-70E740481C1C}">
+                <a14:useLocalDpi xmlns:a14="http://schemas.microsoft.com/office/drawing/2010/main" val="0"/>
+              </a:ext>
+            </a:extLst>
+          </a:blip>
+          <a:stretch>
+            <a:fillRect/>
+          </a:stretch>
+        </p:blipFill>
+        <p:spPr>
+          <a:xfrm>
+            <a:off x="3367676" y="1804866"/>
+            <a:ext cx="5898685" cy="4688009"/>
+          </a:xfrm>
+          <a:prstGeom prst="rect">
+            <a:avLst/>
+          </a:prstGeom>
+        </p:spPr>
+      </p:pic>
+      <p:sp>
+        <p:nvSpPr>
+          <p:cNvPr id="9" name="TextBox 8">
+            <a:extLst>
+              <a:ext uri="{FF2B5EF4-FFF2-40B4-BE49-F238E27FC236}">
+                <a16:creationId xmlns:a16="http://schemas.microsoft.com/office/drawing/2014/main" id="{5C4E34DB-D2E4-27BE-B8D8-8E6E666A5F7B}"/>
               </a:ext>
             </a:extLst>
           </p:cNvPr>
@@ -7343,8 +7686,166 @@
         </p:nvSpPr>
         <p:spPr>
           <a:xfrm>
-            <a:off x="838200" y="3236685"/>
-            <a:ext cx="8770257" cy="1477328"/>
+            <a:off x="5331655" y="729733"/>
+            <a:ext cx="3726789" cy="369332"/>
+          </a:xfrm>
+          <a:prstGeom prst="rect">
+            <a:avLst/>
+          </a:prstGeom>
+          <a:noFill/>
+        </p:spPr>
+        <p:txBody>
+          <a:bodyPr wrap="none" rtlCol="0">
+            <a:spAutoFit/>
+          </a:bodyPr>
+          <a:lstStyle/>
+          <a:p>
+            <a:r>
+              <a:rPr lang="en-US" dirty="0"/>
+              <a:t>Once you have the device, call .</a:t>
+            </a:r>
+            <a:r>
+              <a:rPr lang="en-US" dirty="0" err="1"/>
+              <a:t>gui</a:t>
+            </a:r>
+            <a:r>
+              <a:rPr lang="en-US" dirty="0"/>
+              <a:t>()</a:t>
+            </a:r>
+          </a:p>
+        </p:txBody>
+      </p:sp>
+      <p:cxnSp>
+        <p:nvCxnSpPr>
+          <p:cNvPr id="11" name="Straight Arrow Connector 10">
+            <a:extLst>
+              <a:ext uri="{FF2B5EF4-FFF2-40B4-BE49-F238E27FC236}">
+                <a16:creationId xmlns:a16="http://schemas.microsoft.com/office/drawing/2014/main" id="{47943412-DE93-42AF-5ADA-0DB2188402F9}"/>
+              </a:ext>
+            </a:extLst>
+          </p:cNvPr>
+          <p:cNvCxnSpPr/>
+          <p:nvPr/>
+        </p:nvCxnSpPr>
+        <p:spPr>
+          <a:xfrm flipH="1" flipV="1">
+            <a:off x="1842868" y="2250831"/>
+            <a:ext cx="1716258" cy="267286"/>
+          </a:xfrm>
+          <a:prstGeom prst="straightConnector1">
+            <a:avLst/>
+          </a:prstGeom>
+          <a:ln>
+            <a:tailEnd type="triangle"/>
+          </a:ln>
+        </p:spPr>
+        <p:style>
+          <a:lnRef idx="2">
+            <a:schemeClr val="accent1"/>
+          </a:lnRef>
+          <a:fillRef idx="0">
+            <a:schemeClr val="accent1"/>
+          </a:fillRef>
+          <a:effectRef idx="1">
+            <a:schemeClr val="accent1"/>
+          </a:effectRef>
+          <a:fontRef idx="minor">
+            <a:schemeClr val="tx1"/>
+          </a:fontRef>
+        </p:style>
+      </p:cxnSp>
+      <p:sp>
+        <p:nvSpPr>
+          <p:cNvPr id="12" name="TextBox 11">
+            <a:extLst>
+              <a:ext uri="{FF2B5EF4-FFF2-40B4-BE49-F238E27FC236}">
+                <a16:creationId xmlns:a16="http://schemas.microsoft.com/office/drawing/2014/main" id="{C1F3A464-BFEE-64D6-6985-EC15FD54C1B0}"/>
+              </a:ext>
+            </a:extLst>
+          </p:cNvPr>
+          <p:cNvSpPr txBox="1"/>
+          <p:nvPr/>
+        </p:nvSpPr>
+        <p:spPr>
+          <a:xfrm>
+            <a:off x="249194" y="1881499"/>
+            <a:ext cx="3187347" cy="369332"/>
+          </a:xfrm>
+          <a:prstGeom prst="rect">
+            <a:avLst/>
+          </a:prstGeom>
+          <a:noFill/>
+        </p:spPr>
+        <p:txBody>
+          <a:bodyPr wrap="none" rtlCol="0">
+            <a:spAutoFit/>
+          </a:bodyPr>
+          <a:lstStyle/>
+          <a:p>
+            <a:r>
+              <a:rPr lang="en-US" dirty="0"/>
+              <a:t>Check remote devices section</a:t>
+            </a:r>
+          </a:p>
+        </p:txBody>
+      </p:sp>
+      <p:cxnSp>
+        <p:nvCxnSpPr>
+          <p:cNvPr id="14" name="Straight Arrow Connector 13">
+            <a:extLst>
+              <a:ext uri="{FF2B5EF4-FFF2-40B4-BE49-F238E27FC236}">
+                <a16:creationId xmlns:a16="http://schemas.microsoft.com/office/drawing/2014/main" id="{CE3EEDB2-26EF-2A5C-78BE-5A447F2ECC3C}"/>
+              </a:ext>
+            </a:extLst>
+          </p:cNvPr>
+          <p:cNvCxnSpPr>
+            <a:cxnSpLocks/>
+          </p:cNvCxnSpPr>
+          <p:nvPr/>
+        </p:nvCxnSpPr>
+        <p:spPr>
+          <a:xfrm flipH="1" flipV="1">
+            <a:off x="2562896" y="3876541"/>
+            <a:ext cx="996230" cy="272329"/>
+          </a:xfrm>
+          <a:prstGeom prst="straightConnector1">
+            <a:avLst/>
+          </a:prstGeom>
+          <a:ln>
+            <a:tailEnd type="triangle"/>
+          </a:ln>
+        </p:spPr>
+        <p:style>
+          <a:lnRef idx="2">
+            <a:schemeClr val="accent1"/>
+          </a:lnRef>
+          <a:fillRef idx="0">
+            <a:schemeClr val="accent1"/>
+          </a:fillRef>
+          <a:effectRef idx="1">
+            <a:schemeClr val="accent1"/>
+          </a:effectRef>
+          <a:fontRef idx="minor">
+            <a:schemeClr val="tx1"/>
+          </a:fontRef>
+        </p:style>
+      </p:cxnSp>
+      <p:sp>
+        <p:nvSpPr>
+          <p:cNvPr id="15" name="TextBox 14">
+            <a:extLst>
+              <a:ext uri="{FF2B5EF4-FFF2-40B4-BE49-F238E27FC236}">
+                <a16:creationId xmlns:a16="http://schemas.microsoft.com/office/drawing/2014/main" id="{C0F80C07-B11A-45EE-E7DD-ECC4CF61C3BB}"/>
+              </a:ext>
+            </a:extLst>
+          </p:cNvPr>
+          <p:cNvSpPr txBox="1"/>
+          <p:nvPr/>
+        </p:nvSpPr>
+        <p:spPr>
+          <a:xfrm>
+            <a:off x="298349" y="2946043"/>
+            <a:ext cx="2627290" cy="1200329"/>
           </a:xfrm>
           <a:prstGeom prst="rect">
             <a:avLst/>
@@ -7359,25 +7860,165 @@
           <a:p>
             <a:r>
               <a:rPr lang="en-US" dirty="0"/>
-              <a:t>Generate key and certificate before you can safely create remote device at server and use at client.</a:t>
-            </a:r>
-            <a:br>
-              <a:rPr lang="en-US" dirty="0"/>
-            </a:br>
-            <a:br>
-              <a:rPr lang="en-US" dirty="0"/>
-            </a:br>
-            <a:r>
-              <a:rPr lang="en-US" dirty="0"/>
-              <a:t>Run this </a:t>
+              <a:t>If the device is interrupted by external , normally you don’t need to care about this</a:t>
+            </a:r>
+          </a:p>
+        </p:txBody>
+      </p:sp>
+      <p:cxnSp>
+        <p:nvCxnSpPr>
+          <p:cNvPr id="18" name="Straight Arrow Connector 17">
+            <a:extLst>
+              <a:ext uri="{FF2B5EF4-FFF2-40B4-BE49-F238E27FC236}">
+                <a16:creationId xmlns:a16="http://schemas.microsoft.com/office/drawing/2014/main" id="{32A21CCF-D016-96CD-2B0E-8CFC43DD5537}"/>
+              </a:ext>
+            </a:extLst>
+          </p:cNvPr>
+          <p:cNvCxnSpPr/>
+          <p:nvPr/>
+        </p:nvCxnSpPr>
+        <p:spPr>
+          <a:xfrm flipH="1">
+            <a:off x="1842867" y="5589431"/>
+            <a:ext cx="1593674" cy="0"/>
+          </a:xfrm>
+          <a:prstGeom prst="straightConnector1">
+            <a:avLst/>
+          </a:prstGeom>
+          <a:ln>
+            <a:tailEnd type="triangle"/>
+          </a:ln>
+        </p:spPr>
+        <p:style>
+          <a:lnRef idx="2">
+            <a:schemeClr val="accent1"/>
+          </a:lnRef>
+          <a:fillRef idx="0">
+            <a:schemeClr val="accent1"/>
+          </a:fillRef>
+          <a:effectRef idx="1">
+            <a:schemeClr val="accent1"/>
+          </a:effectRef>
+          <a:fontRef idx="minor">
+            <a:schemeClr val="tx1"/>
+          </a:fontRef>
+        </p:style>
+      </p:cxnSp>
+      <p:sp>
+        <p:nvSpPr>
+          <p:cNvPr id="19" name="TextBox 18">
+            <a:extLst>
+              <a:ext uri="{FF2B5EF4-FFF2-40B4-BE49-F238E27FC236}">
+                <a16:creationId xmlns:a16="http://schemas.microsoft.com/office/drawing/2014/main" id="{65851BEC-AE4C-9917-A23D-32315EA15669}"/>
+              </a:ext>
+            </a:extLst>
+          </p:cNvPr>
+          <p:cNvSpPr txBox="1"/>
+          <p:nvPr/>
+        </p:nvSpPr>
+        <p:spPr>
+          <a:xfrm>
+            <a:off x="249194" y="5127766"/>
+            <a:ext cx="1697893" cy="923330"/>
+          </a:xfrm>
+          <a:prstGeom prst="rect">
+            <a:avLst/>
+          </a:prstGeom>
+          <a:noFill/>
+        </p:spPr>
+        <p:txBody>
+          <a:bodyPr wrap="square" rtlCol="0">
+            <a:spAutoFit/>
+          </a:bodyPr>
+          <a:lstStyle/>
+          <a:p>
+            <a:r>
+              <a:rPr lang="en-US" dirty="0"/>
+              <a:t>Set by </a:t>
             </a:r>
             <a:r>
               <a:rPr lang="en-US" dirty="0" err="1"/>
-              <a:t>generate_ssl_certificate</a:t>
-            </a:r>
-            <a:r>
-              <a:rPr lang="en-US" dirty="0"/>
-              <a:t>() at server, and make sure you have the same (copy using flash drive etc.) file at the client.</a:t>
+              <a:t>frequency_lb</a:t>
+            </a:r>
+            <a:r>
+              <a:rPr lang="en-US" dirty="0"/>
+              <a:t>, </a:t>
+            </a:r>
+            <a:r>
+              <a:rPr lang="en-US" dirty="0" err="1"/>
+              <a:t>frequency_ub</a:t>
+            </a:r>
+            <a:endParaRPr lang="en-US" dirty="0"/>
+          </a:p>
+        </p:txBody>
+      </p:sp>
+      <p:pic>
+        <p:nvPicPr>
+          <p:cNvPr id="21" name="Picture 20" descr="A screenshot of a computer&#10;&#10;AI-generated content may be incorrect.">
+            <a:extLst>
+              <a:ext uri="{FF2B5EF4-FFF2-40B4-BE49-F238E27FC236}">
+                <a16:creationId xmlns:a16="http://schemas.microsoft.com/office/drawing/2014/main" id="{4D72A41B-17CE-6AF0-FA72-6EEC0DB3B623}"/>
+              </a:ext>
+            </a:extLst>
+          </p:cNvPr>
+          <p:cNvPicPr>
+            <a:picLocks noChangeAspect="1"/>
+          </p:cNvPicPr>
+          <p:nvPr/>
+        </p:nvPicPr>
+        <p:blipFill>
+          <a:blip r:embed="rId4">
+            <a:extLst>
+              <a:ext uri="{28A0092B-C50C-407E-A947-70E740481C1C}">
+                <a14:useLocalDpi xmlns:a14="http://schemas.microsoft.com/office/drawing/2010/main" val="0"/>
+              </a:ext>
+            </a:extLst>
+          </a:blip>
+          <a:stretch>
+            <a:fillRect/>
+          </a:stretch>
+        </p:blipFill>
+        <p:spPr>
+          <a:xfrm>
+            <a:off x="9680986" y="1755233"/>
+            <a:ext cx="1200318" cy="1047896"/>
+          </a:xfrm>
+          <a:prstGeom prst="rect">
+            <a:avLst/>
+          </a:prstGeom>
+        </p:spPr>
+      </p:pic>
+      <p:sp>
+        <p:nvSpPr>
+          <p:cNvPr id="22" name="TextBox 21">
+            <a:extLst>
+              <a:ext uri="{FF2B5EF4-FFF2-40B4-BE49-F238E27FC236}">
+                <a16:creationId xmlns:a16="http://schemas.microsoft.com/office/drawing/2014/main" id="{ADCF8A5F-83A6-1B42-160C-2A365E1C4137}"/>
+              </a:ext>
+            </a:extLst>
+          </p:cNvPr>
+          <p:cNvSpPr txBox="1"/>
+          <p:nvPr/>
+        </p:nvSpPr>
+        <p:spPr>
+          <a:xfrm>
+            <a:off x="9708398" y="2946043"/>
+            <a:ext cx="1884242" cy="1477328"/>
+          </a:xfrm>
+          <a:prstGeom prst="rect">
+            <a:avLst/>
+          </a:prstGeom>
+          <a:noFill/>
+        </p:spPr>
+        <p:txBody>
+          <a:bodyPr wrap="square" rtlCol="0">
+            <a:spAutoFit/>
+          </a:bodyPr>
+          <a:lstStyle/>
+          <a:p>
+            <a:r>
+              <a:rPr lang="en-US" dirty="0"/>
+              <a:t>You can also access/change the property of device in non-GUI way</a:t>
             </a:r>
           </a:p>
         </p:txBody>
@@ -7385,7 +8026,7 @@
     </p:spTree>
     <p:extLst>
       <p:ext uri="{BB962C8B-B14F-4D97-AF65-F5344CB8AC3E}">
-        <p14:creationId xmlns:p14="http://schemas.microsoft.com/office/powerpoint/2010/main" val="2323925940"/>
+        <p14:creationId xmlns:p14="http://schemas.microsoft.com/office/powerpoint/2010/main" val="309546426"/>
       </p:ext>
     </p:extLst>
   </p:cSld>
@@ -7414,10 +8055,10 @@
       </p:grpSpPr>
       <p:sp>
         <p:nvSpPr>
-          <p:cNvPr id="2" name="标题 1">
-            <a:extLst>
-              <a:ext uri="{FF2B5EF4-FFF2-40B4-BE49-F238E27FC236}">
-                <a16:creationId xmlns:a16="http://schemas.microsoft.com/office/drawing/2014/main" id="{E062D5C1-1152-3FBF-F7B6-7F82E63C694D}"/>
+          <p:cNvPr id="2" name="Title 1">
+            <a:extLst>
+              <a:ext uri="{FF2B5EF4-FFF2-40B4-BE49-F238E27FC236}">
+                <a16:creationId xmlns:a16="http://schemas.microsoft.com/office/drawing/2014/main" id="{15CC32D6-6EDD-8C21-0412-E888AE7FC482}"/>
               </a:ext>
             </a:extLst>
           </p:cNvPr>
@@ -7442,19 +8083,17 @@
       </p:sp>
       <p:pic>
         <p:nvPicPr>
-          <p:cNvPr id="5" name="Content Placeholder 4" descr="A screenshot of a chat&#10;&#10;AI-generated content may be incorrect.">
-            <a:extLst>
-              <a:ext uri="{FF2B5EF4-FFF2-40B4-BE49-F238E27FC236}">
-                <a16:creationId xmlns:a16="http://schemas.microsoft.com/office/drawing/2014/main" id="{B8688DBB-24CD-AD23-5EAB-EC6041DBC932}"/>
+          <p:cNvPr id="6" name="Picture 5" descr="A screenshot of a computer&#10;&#10;AI-generated content may be incorrect.">
+            <a:extLst>
+              <a:ext uri="{FF2B5EF4-FFF2-40B4-BE49-F238E27FC236}">
+                <a16:creationId xmlns:a16="http://schemas.microsoft.com/office/drawing/2014/main" id="{99E0E41E-0E17-2F5E-72DB-597376FFE5AF}"/>
               </a:ext>
             </a:extLst>
           </p:cNvPr>
           <p:cNvPicPr>
-            <a:picLocks noGrp="1" noChangeAspect="1"/>
+            <a:picLocks noChangeAspect="1"/>
           </p:cNvPicPr>
-          <p:nvPr>
-            <p:ph idx="1"/>
-          </p:nvPr>
+          <p:nvPr/>
         </p:nvPicPr>
         <p:blipFill>
           <a:blip r:embed="rId2">
@@ -7470,53 +8109,20 @@
         </p:blipFill>
         <p:spPr>
           <a:xfrm>
-            <a:off x="838200" y="1526872"/>
-            <a:ext cx="4086795" cy="2267266"/>
-          </a:xfrm>
+            <a:off x="838200" y="1504627"/>
+            <a:ext cx="7020905" cy="1381318"/>
+          </a:xfrm>
+          <a:prstGeom prst="rect">
+            <a:avLst/>
+          </a:prstGeom>
         </p:spPr>
       </p:pic>
-      <p:pic>
-        <p:nvPicPr>
-          <p:cNvPr id="7" name="Picture 6" descr="A screenshot of a computer error&#10;&#10;AI-generated content may be incorrect.">
-            <a:extLst>
-              <a:ext uri="{FF2B5EF4-FFF2-40B4-BE49-F238E27FC236}">
-                <a16:creationId xmlns:a16="http://schemas.microsoft.com/office/drawing/2014/main" id="{69EE6358-5F4D-E09C-D352-988C9284477F}"/>
-              </a:ext>
-            </a:extLst>
-          </p:cNvPr>
-          <p:cNvPicPr>
-            <a:picLocks noChangeAspect="1"/>
-          </p:cNvPicPr>
-          <p:nvPr/>
-        </p:nvPicPr>
-        <p:blipFill>
-          <a:blip r:embed="rId3">
-            <a:extLst>
-              <a:ext uri="{28A0092B-C50C-407E-A947-70E740481C1C}">
-                <a14:useLocalDpi xmlns:a14="http://schemas.microsoft.com/office/drawing/2010/main" val="0"/>
-              </a:ext>
-            </a:extLst>
-          </a:blip>
-          <a:stretch>
-            <a:fillRect/>
-          </a:stretch>
-        </p:blipFill>
-        <p:spPr>
-          <a:xfrm>
-            <a:off x="5223609" y="1498293"/>
-            <a:ext cx="4086795" cy="2295845"/>
-          </a:xfrm>
-          <a:prstGeom prst="rect">
-            <a:avLst/>
-          </a:prstGeom>
-        </p:spPr>
-      </p:pic>
-      <p:sp>
-        <p:nvSpPr>
-          <p:cNvPr id="8" name="TextBox 7">
-            <a:extLst>
-              <a:ext uri="{FF2B5EF4-FFF2-40B4-BE49-F238E27FC236}">
-                <a16:creationId xmlns:a16="http://schemas.microsoft.com/office/drawing/2014/main" id="{C78B74B1-B058-36FE-E5BE-D40E055AA535}"/>
+      <p:sp>
+        <p:nvSpPr>
+          <p:cNvPr id="7" name="TextBox 6">
+            <a:extLst>
+              <a:ext uri="{FF2B5EF4-FFF2-40B4-BE49-F238E27FC236}">
+                <a16:creationId xmlns:a16="http://schemas.microsoft.com/office/drawing/2014/main" id="{E1F829AF-CE25-66BD-9694-F692B2512320}"/>
               </a:ext>
             </a:extLst>
           </p:cNvPr>
@@ -7525,8 +8131,8 @@
         </p:nvSpPr>
         <p:spPr>
           <a:xfrm>
-            <a:off x="838200" y="3938954"/>
-            <a:ext cx="9374945" cy="1200329"/>
+            <a:off x="838200" y="3236685"/>
+            <a:ext cx="8770257" cy="1477328"/>
           </a:xfrm>
           <a:prstGeom prst="rect">
             <a:avLst/>
@@ -7541,15 +8147,7 @@
           <a:p>
             <a:r>
               <a:rPr lang="en-US" dirty="0"/>
-              <a:t>Open and close allow access on the server device. The client can then access to server device using the </a:t>
-            </a:r>
-            <a:r>
-              <a:rPr lang="en-US" dirty="0" err="1"/>
-              <a:t>ip</a:t>
-            </a:r>
-            <a:r>
-              <a:rPr lang="en-US" dirty="0"/>
-              <a:t> and port shown above.</a:t>
+              <a:t>Generate key and certificate before you can safely create remote device at server and use at client.</a:t>
             </a:r>
             <a:br>
               <a:rPr lang="en-US" dirty="0"/>
@@ -7559,23 +8157,15 @@
             </a:br>
             <a:r>
               <a:rPr lang="en-US" dirty="0"/>
-              <a:t>The device on client side should be initialized using </a:t>
+              <a:t>Run this </a:t>
             </a:r>
             <a:r>
               <a:rPr lang="en-US" dirty="0" err="1"/>
-              <a:t>RemoteDevice</a:t>
-            </a:r>
-            <a:r>
-              <a:rPr lang="en-US" dirty="0"/>
-              <a:t> class with </a:t>
-            </a:r>
-            <a:r>
-              <a:rPr lang="en-US" dirty="0" err="1"/>
-              <a:t>ip</a:t>
-            </a:r>
-            <a:r>
-              <a:rPr lang="en-US" dirty="0"/>
-              <a:t> and port. </a:t>
+              <a:t>generate_ssl_certificate</a:t>
+            </a:r>
+            <a:r>
+              <a:rPr lang="en-US" dirty="0"/>
+              <a:t>() at server, and make sure you have the same (copy using flash drive etc.) file at the client.</a:t>
             </a:r>
           </a:p>
         </p:txBody>
@@ -7583,7 +8173,7 @@
     </p:spTree>
     <p:extLst>
       <p:ext uri="{BB962C8B-B14F-4D97-AF65-F5344CB8AC3E}">
-        <p14:creationId xmlns:p14="http://schemas.microsoft.com/office/powerpoint/2010/main" val="2160298866"/>
+        <p14:creationId xmlns:p14="http://schemas.microsoft.com/office/powerpoint/2010/main" val="2323925940"/>
       </p:ext>
     </p:extLst>
   </p:cSld>

</xml_diff>